<commit_message>
Document new UI structure
</commit_message>
<xml_diff>
--- a/docs/diagrams/ArchitectureDiagram.pptx
+++ b/docs/diagrams/ArchitectureDiagram.pptx
@@ -273,7 +273,7 @@
           <a:p>
             <a:fld id="{A1DDB25B-591A-4807-BF87-81D6EC4FFA73}" type="datetimeFigureOut">
               <a:rPr lang="en-SG" smtClean="0"/>
-              <a:t>8/4/2020</a:t>
+              <a:t>26/5/2020</a:t>
             </a:fld>
             <a:endParaRPr lang="en-SG"/>
           </a:p>
@@ -473,7 +473,7 @@
           <a:p>
             <a:fld id="{A1DDB25B-591A-4807-BF87-81D6EC4FFA73}" type="datetimeFigureOut">
               <a:rPr lang="en-SG" smtClean="0"/>
-              <a:t>8/4/2020</a:t>
+              <a:t>26/5/2020</a:t>
             </a:fld>
             <a:endParaRPr lang="en-SG"/>
           </a:p>
@@ -683,7 +683,7 @@
           <a:p>
             <a:fld id="{A1DDB25B-591A-4807-BF87-81D6EC4FFA73}" type="datetimeFigureOut">
               <a:rPr lang="en-SG" smtClean="0"/>
-              <a:t>8/4/2020</a:t>
+              <a:t>26/5/2020</a:t>
             </a:fld>
             <a:endParaRPr lang="en-SG"/>
           </a:p>
@@ -883,7 +883,7 @@
           <a:p>
             <a:fld id="{A1DDB25B-591A-4807-BF87-81D6EC4FFA73}" type="datetimeFigureOut">
               <a:rPr lang="en-SG" smtClean="0"/>
-              <a:t>8/4/2020</a:t>
+              <a:t>26/5/2020</a:t>
             </a:fld>
             <a:endParaRPr lang="en-SG"/>
           </a:p>
@@ -1159,7 +1159,7 @@
           <a:p>
             <a:fld id="{A1DDB25B-591A-4807-BF87-81D6EC4FFA73}" type="datetimeFigureOut">
               <a:rPr lang="en-SG" smtClean="0"/>
-              <a:t>8/4/2020</a:t>
+              <a:t>26/5/2020</a:t>
             </a:fld>
             <a:endParaRPr lang="en-SG"/>
           </a:p>
@@ -1427,7 +1427,7 @@
           <a:p>
             <a:fld id="{A1DDB25B-591A-4807-BF87-81D6EC4FFA73}" type="datetimeFigureOut">
               <a:rPr lang="en-SG" smtClean="0"/>
-              <a:t>8/4/2020</a:t>
+              <a:t>26/5/2020</a:t>
             </a:fld>
             <a:endParaRPr lang="en-SG"/>
           </a:p>
@@ -1842,7 +1842,7 @@
           <a:p>
             <a:fld id="{A1DDB25B-591A-4807-BF87-81D6EC4FFA73}" type="datetimeFigureOut">
               <a:rPr lang="en-SG" smtClean="0"/>
-              <a:t>8/4/2020</a:t>
+              <a:t>26/5/2020</a:t>
             </a:fld>
             <a:endParaRPr lang="en-SG"/>
           </a:p>
@@ -1984,7 +1984,7 @@
           <a:p>
             <a:fld id="{A1DDB25B-591A-4807-BF87-81D6EC4FFA73}" type="datetimeFigureOut">
               <a:rPr lang="en-SG" smtClean="0"/>
-              <a:t>8/4/2020</a:t>
+              <a:t>26/5/2020</a:t>
             </a:fld>
             <a:endParaRPr lang="en-SG"/>
           </a:p>
@@ -2097,7 +2097,7 @@
           <a:p>
             <a:fld id="{A1DDB25B-591A-4807-BF87-81D6EC4FFA73}" type="datetimeFigureOut">
               <a:rPr lang="en-SG" smtClean="0"/>
-              <a:t>8/4/2020</a:t>
+              <a:t>26/5/2020</a:t>
             </a:fld>
             <a:endParaRPr lang="en-SG"/>
           </a:p>
@@ -2410,7 +2410,7 @@
           <a:p>
             <a:fld id="{A1DDB25B-591A-4807-BF87-81D6EC4FFA73}" type="datetimeFigureOut">
               <a:rPr lang="en-SG" smtClean="0"/>
-              <a:t>8/4/2020</a:t>
+              <a:t>26/5/2020</a:t>
             </a:fld>
             <a:endParaRPr lang="en-SG"/>
           </a:p>
@@ -2699,7 +2699,7 @@
           <a:p>
             <a:fld id="{A1DDB25B-591A-4807-BF87-81D6EC4FFA73}" type="datetimeFigureOut">
               <a:rPr lang="en-SG" smtClean="0"/>
-              <a:t>8/4/2020</a:t>
+              <a:t>26/5/2020</a:t>
             </a:fld>
             <a:endParaRPr lang="en-SG"/>
           </a:p>
@@ -2942,7 +2942,7 @@
           <a:p>
             <a:fld id="{A1DDB25B-591A-4807-BF87-81D6EC4FFA73}" type="datetimeFigureOut">
               <a:rPr lang="en-SG" smtClean="0"/>
-              <a:t>8/4/2020</a:t>
+              <a:t>26/5/2020</a:t>
             </a:fld>
             <a:endParaRPr lang="en-SG"/>
           </a:p>
@@ -3549,7 +3549,7 @@
                   <a:schemeClr val="tx1"/>
                 </a:solidFill>
               </a:rPr>
-              <a:t>MainUiManager</a:t>
+              <a:t>UiManager</a:t>
             </a:r>
             <a:endParaRPr lang="en-SG" dirty="0">
               <a:solidFill>

</xml_diff>

<commit_message>
Add layer diagram in guide
</commit_message>
<xml_diff>
--- a/docs/diagrams/ArchitectureDiagram.pptx
+++ b/docs/diagrams/ArchitectureDiagram.pptx
@@ -6,6 +6,7 @@
   </p:sldMasterIdLst>
   <p:sldIdLst>
     <p:sldId id="256" r:id="rId2"/>
+    <p:sldId id="257" r:id="rId3"/>
   </p:sldIdLst>
   <p:sldSz cx="12192000" cy="6858000"/>
   <p:notesSz cx="6858000" cy="9144000"/>
@@ -273,7 +274,7 @@
           <a:p>
             <a:fld id="{A1DDB25B-591A-4807-BF87-81D6EC4FFA73}" type="datetimeFigureOut">
               <a:rPr lang="en-SG" smtClean="0"/>
-              <a:t>26/5/2020</a:t>
+              <a:t>27/5/2020</a:t>
             </a:fld>
             <a:endParaRPr lang="en-SG"/>
           </a:p>
@@ -473,7 +474,7 @@
           <a:p>
             <a:fld id="{A1DDB25B-591A-4807-BF87-81D6EC4FFA73}" type="datetimeFigureOut">
               <a:rPr lang="en-SG" smtClean="0"/>
-              <a:t>26/5/2020</a:t>
+              <a:t>27/5/2020</a:t>
             </a:fld>
             <a:endParaRPr lang="en-SG"/>
           </a:p>
@@ -683,7 +684,7 @@
           <a:p>
             <a:fld id="{A1DDB25B-591A-4807-BF87-81D6EC4FFA73}" type="datetimeFigureOut">
               <a:rPr lang="en-SG" smtClean="0"/>
-              <a:t>26/5/2020</a:t>
+              <a:t>27/5/2020</a:t>
             </a:fld>
             <a:endParaRPr lang="en-SG"/>
           </a:p>
@@ -883,7 +884,7 @@
           <a:p>
             <a:fld id="{A1DDB25B-591A-4807-BF87-81D6EC4FFA73}" type="datetimeFigureOut">
               <a:rPr lang="en-SG" smtClean="0"/>
-              <a:t>26/5/2020</a:t>
+              <a:t>27/5/2020</a:t>
             </a:fld>
             <a:endParaRPr lang="en-SG"/>
           </a:p>
@@ -1159,7 +1160,7 @@
           <a:p>
             <a:fld id="{A1DDB25B-591A-4807-BF87-81D6EC4FFA73}" type="datetimeFigureOut">
               <a:rPr lang="en-SG" smtClean="0"/>
-              <a:t>26/5/2020</a:t>
+              <a:t>27/5/2020</a:t>
             </a:fld>
             <a:endParaRPr lang="en-SG"/>
           </a:p>
@@ -1427,7 +1428,7 @@
           <a:p>
             <a:fld id="{A1DDB25B-591A-4807-BF87-81D6EC4FFA73}" type="datetimeFigureOut">
               <a:rPr lang="en-SG" smtClean="0"/>
-              <a:t>26/5/2020</a:t>
+              <a:t>27/5/2020</a:t>
             </a:fld>
             <a:endParaRPr lang="en-SG"/>
           </a:p>
@@ -1842,7 +1843,7 @@
           <a:p>
             <a:fld id="{A1DDB25B-591A-4807-BF87-81D6EC4FFA73}" type="datetimeFigureOut">
               <a:rPr lang="en-SG" smtClean="0"/>
-              <a:t>26/5/2020</a:t>
+              <a:t>27/5/2020</a:t>
             </a:fld>
             <a:endParaRPr lang="en-SG"/>
           </a:p>
@@ -1984,7 +1985,7 @@
           <a:p>
             <a:fld id="{A1DDB25B-591A-4807-BF87-81D6EC4FFA73}" type="datetimeFigureOut">
               <a:rPr lang="en-SG" smtClean="0"/>
-              <a:t>26/5/2020</a:t>
+              <a:t>27/5/2020</a:t>
             </a:fld>
             <a:endParaRPr lang="en-SG"/>
           </a:p>
@@ -2097,7 +2098,7 @@
           <a:p>
             <a:fld id="{A1DDB25B-591A-4807-BF87-81D6EC4FFA73}" type="datetimeFigureOut">
               <a:rPr lang="en-SG" smtClean="0"/>
-              <a:t>26/5/2020</a:t>
+              <a:t>27/5/2020</a:t>
             </a:fld>
             <a:endParaRPr lang="en-SG"/>
           </a:p>
@@ -2410,7 +2411,7 @@
           <a:p>
             <a:fld id="{A1DDB25B-591A-4807-BF87-81D6EC4FFA73}" type="datetimeFigureOut">
               <a:rPr lang="en-SG" smtClean="0"/>
-              <a:t>26/5/2020</a:t>
+              <a:t>27/5/2020</a:t>
             </a:fld>
             <a:endParaRPr lang="en-SG"/>
           </a:p>
@@ -2699,7 +2700,7 @@
           <a:p>
             <a:fld id="{A1DDB25B-591A-4807-BF87-81D6EC4FFA73}" type="datetimeFigureOut">
               <a:rPr lang="en-SG" smtClean="0"/>
-              <a:t>26/5/2020</a:t>
+              <a:t>27/5/2020</a:t>
             </a:fld>
             <a:endParaRPr lang="en-SG"/>
           </a:p>
@@ -2942,7 +2943,7 @@
           <a:p>
             <a:fld id="{A1DDB25B-591A-4807-BF87-81D6EC4FFA73}" type="datetimeFigureOut">
               <a:rPr lang="en-SG" smtClean="0"/>
-              <a:t>26/5/2020</a:t>
+              <a:t>27/5/2020</a:t>
             </a:fld>
             <a:endParaRPr lang="en-SG"/>
           </a:p>
@@ -4929,6 +4930,2118 @@
 </p:sld>
 </file>
 
+<file path=ppt/slides/slide2.xml><?xml version="1.0" encoding="utf-8"?>
+<p:sld xmlns:a="http://schemas.openxmlformats.org/drawingml/2006/main" xmlns:r="http://schemas.openxmlformats.org/officeDocument/2006/relationships" xmlns:p="http://schemas.openxmlformats.org/presentationml/2006/main">
+  <p:cSld>
+    <p:spTree>
+      <p:nvGrpSpPr>
+        <p:cNvPr id="1" name=""/>
+        <p:cNvGrpSpPr/>
+        <p:nvPr/>
+      </p:nvGrpSpPr>
+      <p:grpSpPr>
+        <a:xfrm>
+          <a:off x="0" y="0"/>
+          <a:ext cx="0" cy="0"/>
+          <a:chOff x="0" y="0"/>
+          <a:chExt cx="0" cy="0"/>
+        </a:xfrm>
+      </p:grpSpPr>
+      <p:sp>
+        <p:nvSpPr>
+          <p:cNvPr id="35" name="Rectangle: Rounded Corners 34">
+            <a:extLst>
+              <a:ext uri="{FF2B5EF4-FFF2-40B4-BE49-F238E27FC236}">
+                <a16:creationId xmlns:a16="http://schemas.microsoft.com/office/drawing/2014/main" id="{98029ACE-CAF4-4144-85CE-1F06FF0B9767}"/>
+              </a:ext>
+            </a:extLst>
+          </p:cNvPr>
+          <p:cNvSpPr/>
+          <p:nvPr/>
+        </p:nvSpPr>
+        <p:spPr>
+          <a:xfrm>
+            <a:off x="5163052" y="1536065"/>
+            <a:ext cx="2232043" cy="425609"/>
+          </a:xfrm>
+          <a:prstGeom prst="roundRect">
+            <a:avLst>
+              <a:gd name="adj" fmla="val 5708"/>
+            </a:avLst>
+          </a:prstGeom>
+          <a:solidFill>
+            <a:schemeClr val="bg1">
+              <a:lumMod val="85000"/>
+            </a:schemeClr>
+          </a:solidFill>
+          <a:ln w="12700"/>
+        </p:spPr>
+        <p:style>
+          <a:lnRef idx="2">
+            <a:schemeClr val="dk1">
+              <a:shade val="50000"/>
+            </a:schemeClr>
+          </a:lnRef>
+          <a:fillRef idx="1">
+            <a:schemeClr val="dk1"/>
+          </a:fillRef>
+          <a:effectRef idx="0">
+            <a:schemeClr val="dk1"/>
+          </a:effectRef>
+          <a:fontRef idx="minor">
+            <a:schemeClr val="lt1"/>
+          </a:fontRef>
+        </p:style>
+        <p:txBody>
+          <a:bodyPr rtlCol="0" anchor="ctr" anchorCtr="0"/>
+          <a:lstStyle/>
+          <a:p>
+            <a:pPr algn="ctr"/>
+            <a:r>
+              <a:rPr lang="en-US" dirty="0" err="1">
+                <a:solidFill>
+                  <a:schemeClr val="tx1"/>
+                </a:solidFill>
+              </a:rPr>
+              <a:t>MainApp</a:t>
+            </a:r>
+            <a:endParaRPr lang="en-SG" dirty="0">
+              <a:solidFill>
+                <a:schemeClr val="tx1"/>
+              </a:solidFill>
+            </a:endParaRPr>
+          </a:p>
+        </p:txBody>
+      </p:sp>
+      <p:sp>
+        <p:nvSpPr>
+          <p:cNvPr id="36" name="Smiley Face 35">
+            <a:extLst>
+              <a:ext uri="{FF2B5EF4-FFF2-40B4-BE49-F238E27FC236}">
+                <a16:creationId xmlns:a16="http://schemas.microsoft.com/office/drawing/2014/main" id="{4739237B-B19F-48F2-9597-C4A1C6B72717}"/>
+              </a:ext>
+            </a:extLst>
+          </p:cNvPr>
+          <p:cNvSpPr/>
+          <p:nvPr/>
+        </p:nvSpPr>
+        <p:spPr>
+          <a:xfrm>
+            <a:off x="2994566" y="1578563"/>
+            <a:ext cx="888082" cy="929299"/>
+          </a:xfrm>
+          <a:prstGeom prst="smileyFace">
+            <a:avLst/>
+          </a:prstGeom>
+          <a:solidFill>
+            <a:schemeClr val="bg1">
+              <a:lumMod val="95000"/>
+            </a:schemeClr>
+          </a:solidFill>
+          <a:ln>
+            <a:solidFill>
+              <a:schemeClr val="tx1"/>
+            </a:solidFill>
+          </a:ln>
+        </p:spPr>
+        <p:style>
+          <a:lnRef idx="2">
+            <a:schemeClr val="accent5">
+              <a:shade val="50000"/>
+            </a:schemeClr>
+          </a:lnRef>
+          <a:fillRef idx="1">
+            <a:schemeClr val="accent5"/>
+          </a:fillRef>
+          <a:effectRef idx="0">
+            <a:schemeClr val="accent5"/>
+          </a:effectRef>
+          <a:fontRef idx="minor">
+            <a:schemeClr val="lt1"/>
+          </a:fontRef>
+        </p:style>
+        <p:txBody>
+          <a:bodyPr rtlCol="0" anchor="ctr"/>
+          <a:lstStyle/>
+          <a:p>
+            <a:pPr algn="ctr"/>
+            <a:endParaRPr lang="en-SG"/>
+          </a:p>
+        </p:txBody>
+      </p:sp>
+      <p:sp>
+        <p:nvSpPr>
+          <p:cNvPr id="39" name="TextBox 38">
+            <a:extLst>
+              <a:ext uri="{FF2B5EF4-FFF2-40B4-BE49-F238E27FC236}">
+                <a16:creationId xmlns:a16="http://schemas.microsoft.com/office/drawing/2014/main" id="{6BAACD33-C207-464E-9093-F9773221B26E}"/>
+              </a:ext>
+            </a:extLst>
+          </p:cNvPr>
+          <p:cNvSpPr txBox="1"/>
+          <p:nvPr/>
+        </p:nvSpPr>
+        <p:spPr>
+          <a:xfrm>
+            <a:off x="2861091" y="1217989"/>
+            <a:ext cx="1155031" cy="375557"/>
+          </a:xfrm>
+          <a:prstGeom prst="rect">
+            <a:avLst/>
+          </a:prstGeom>
+          <a:noFill/>
+        </p:spPr>
+        <p:txBody>
+          <a:bodyPr wrap="square" rtlCol="0">
+            <a:spAutoFit/>
+          </a:bodyPr>
+          <a:lstStyle/>
+          <a:p>
+            <a:pPr algn="ctr"/>
+            <a:r>
+              <a:rPr lang="en-US" dirty="0"/>
+              <a:t>User</a:t>
+            </a:r>
+            <a:endParaRPr lang="en-SG" dirty="0"/>
+          </a:p>
+        </p:txBody>
+      </p:sp>
+      <p:sp>
+        <p:nvSpPr>
+          <p:cNvPr id="40" name="Rectangle: Rounded Corners 39">
+            <a:extLst>
+              <a:ext uri="{FF2B5EF4-FFF2-40B4-BE49-F238E27FC236}">
+                <a16:creationId xmlns:a16="http://schemas.microsoft.com/office/drawing/2014/main" id="{A072C869-D0E0-45EB-9B9E-CE21831AC4D5}"/>
+              </a:ext>
+            </a:extLst>
+          </p:cNvPr>
+          <p:cNvSpPr/>
+          <p:nvPr/>
+        </p:nvSpPr>
+        <p:spPr>
+          <a:xfrm>
+            <a:off x="3780514" y="1826069"/>
+            <a:ext cx="1006683" cy="681793"/>
+          </a:xfrm>
+          <a:prstGeom prst="roundRect">
+            <a:avLst>
+              <a:gd name="adj" fmla="val 0"/>
+            </a:avLst>
+          </a:prstGeom>
+          <a:solidFill>
+            <a:schemeClr val="bg1">
+              <a:lumMod val="85000"/>
+            </a:schemeClr>
+          </a:solidFill>
+          <a:ln w="12700"/>
+        </p:spPr>
+        <p:style>
+          <a:lnRef idx="2">
+            <a:schemeClr val="dk1">
+              <a:shade val="50000"/>
+            </a:schemeClr>
+          </a:lnRef>
+          <a:fillRef idx="1">
+            <a:schemeClr val="dk1"/>
+          </a:fillRef>
+          <a:effectRef idx="0">
+            <a:schemeClr val="dk1"/>
+          </a:effectRef>
+          <a:fontRef idx="minor">
+            <a:schemeClr val="lt1"/>
+          </a:fontRef>
+        </p:style>
+        <p:txBody>
+          <a:bodyPr rtlCol="0" anchor="ctr" anchorCtr="0"/>
+          <a:lstStyle/>
+          <a:p>
+            <a:pPr algn="ctr"/>
+            <a:r>
+              <a:rPr lang="en-US" dirty="0">
+                <a:solidFill>
+                  <a:schemeClr val="tx1"/>
+                </a:solidFill>
+              </a:rPr>
+              <a:t>I/O Devices</a:t>
+            </a:r>
+            <a:endParaRPr lang="en-SG" dirty="0">
+              <a:solidFill>
+                <a:schemeClr val="tx1"/>
+              </a:solidFill>
+            </a:endParaRPr>
+          </a:p>
+        </p:txBody>
+      </p:sp>
+      <p:sp>
+        <p:nvSpPr>
+          <p:cNvPr id="48" name="Action Button: Go Home 47">
+            <a:hlinkClick r:id="" action="ppaction://noaction" highlightClick="1"/>
+            <a:extLst>
+              <a:ext uri="{FF2B5EF4-FFF2-40B4-BE49-F238E27FC236}">
+                <a16:creationId xmlns:a16="http://schemas.microsoft.com/office/drawing/2014/main" id="{967E078F-666C-4545-BE68-76577CDFB0DA}"/>
+              </a:ext>
+            </a:extLst>
+          </p:cNvPr>
+          <p:cNvSpPr/>
+          <p:nvPr/>
+        </p:nvSpPr>
+        <p:spPr>
+          <a:xfrm>
+            <a:off x="5296526" y="896740"/>
+            <a:ext cx="758277" cy="696806"/>
+          </a:xfrm>
+          <a:prstGeom prst="actionButtonHome">
+            <a:avLst/>
+          </a:prstGeom>
+        </p:spPr>
+        <p:style>
+          <a:lnRef idx="2">
+            <a:schemeClr val="dk1"/>
+          </a:lnRef>
+          <a:fillRef idx="1">
+            <a:schemeClr val="lt1"/>
+          </a:fillRef>
+          <a:effectRef idx="0">
+            <a:schemeClr val="dk1"/>
+          </a:effectRef>
+          <a:fontRef idx="minor">
+            <a:schemeClr val="dk1"/>
+          </a:fontRef>
+        </p:style>
+        <p:txBody>
+          <a:bodyPr rtlCol="0" anchor="ctr"/>
+          <a:lstStyle/>
+          <a:p>
+            <a:pPr algn="ctr"/>
+            <a:endParaRPr lang="en-SG"/>
+          </a:p>
+        </p:txBody>
+      </p:sp>
+      <p:sp>
+        <p:nvSpPr>
+          <p:cNvPr id="49" name="TextBox 48">
+            <a:extLst>
+              <a:ext uri="{FF2B5EF4-FFF2-40B4-BE49-F238E27FC236}">
+                <a16:creationId xmlns:a16="http://schemas.microsoft.com/office/drawing/2014/main" id="{454BF994-F8EB-4A17-8E87-76806FF7BFE6}"/>
+              </a:ext>
+            </a:extLst>
+          </p:cNvPr>
+          <p:cNvSpPr txBox="1"/>
+          <p:nvPr/>
+        </p:nvSpPr>
+        <p:spPr>
+          <a:xfrm>
+            <a:off x="4969743" y="546852"/>
+            <a:ext cx="1474824" cy="369332"/>
+          </a:xfrm>
+          <a:prstGeom prst="rect">
+            <a:avLst/>
+          </a:prstGeom>
+          <a:noFill/>
+        </p:spPr>
+        <p:txBody>
+          <a:bodyPr wrap="square" rtlCol="0">
+            <a:spAutoFit/>
+          </a:bodyPr>
+          <a:lstStyle/>
+          <a:p>
+            <a:pPr algn="ctr"/>
+            <a:r>
+              <a:rPr lang="en-US" dirty="0"/>
+              <a:t>Host System</a:t>
+            </a:r>
+            <a:endParaRPr lang="en-SG" dirty="0"/>
+          </a:p>
+        </p:txBody>
+      </p:sp>
+      <p:sp>
+        <p:nvSpPr>
+          <p:cNvPr id="51" name="Rectangle: Rounded Corners 50">
+            <a:extLst>
+              <a:ext uri="{FF2B5EF4-FFF2-40B4-BE49-F238E27FC236}">
+                <a16:creationId xmlns:a16="http://schemas.microsoft.com/office/drawing/2014/main" id="{BAE8C7CB-2B29-4856-80C1-6D28EB9A3682}"/>
+              </a:ext>
+            </a:extLst>
+          </p:cNvPr>
+          <p:cNvSpPr/>
+          <p:nvPr/>
+        </p:nvSpPr>
+        <p:spPr>
+          <a:xfrm>
+            <a:off x="3922873" y="2745963"/>
+            <a:ext cx="2019957" cy="449473"/>
+          </a:xfrm>
+          <a:prstGeom prst="roundRect">
+            <a:avLst>
+              <a:gd name="adj" fmla="val 5708"/>
+            </a:avLst>
+          </a:prstGeom>
+          <a:solidFill>
+            <a:schemeClr val="accent4">
+              <a:lumMod val="60000"/>
+              <a:lumOff val="40000"/>
+            </a:schemeClr>
+          </a:solidFill>
+          <a:ln w="12700"/>
+        </p:spPr>
+        <p:style>
+          <a:lnRef idx="2">
+            <a:schemeClr val="accent4">
+              <a:shade val="50000"/>
+            </a:schemeClr>
+          </a:lnRef>
+          <a:fillRef idx="1">
+            <a:schemeClr val="accent4"/>
+          </a:fillRef>
+          <a:effectRef idx="0">
+            <a:schemeClr val="accent4"/>
+          </a:effectRef>
+          <a:fontRef idx="minor">
+            <a:schemeClr val="lt1"/>
+          </a:fontRef>
+        </p:style>
+        <p:txBody>
+          <a:bodyPr rtlCol="0" anchor="ctr" anchorCtr="0"/>
+          <a:lstStyle/>
+          <a:p>
+            <a:pPr algn="ctr"/>
+            <a:r>
+              <a:rPr lang="en-US" dirty="0" err="1">
+                <a:solidFill>
+                  <a:schemeClr val="tx1"/>
+                </a:solidFill>
+              </a:rPr>
+              <a:t>UiManager</a:t>
+            </a:r>
+            <a:endParaRPr lang="en-SG" dirty="0">
+              <a:solidFill>
+                <a:schemeClr val="tx1"/>
+              </a:solidFill>
+            </a:endParaRPr>
+          </a:p>
+        </p:txBody>
+      </p:sp>
+      <p:sp>
+        <p:nvSpPr>
+          <p:cNvPr id="52" name="Rectangle: Rounded Corners 51">
+            <a:extLst>
+              <a:ext uri="{FF2B5EF4-FFF2-40B4-BE49-F238E27FC236}">
+                <a16:creationId xmlns:a16="http://schemas.microsoft.com/office/drawing/2014/main" id="{C1C14CFD-758A-4DCC-9CFA-D9D06CF9EC1C}"/>
+              </a:ext>
+            </a:extLst>
+          </p:cNvPr>
+          <p:cNvSpPr/>
+          <p:nvPr/>
+        </p:nvSpPr>
+        <p:spPr>
+          <a:xfrm>
+            <a:off x="3922873" y="3427756"/>
+            <a:ext cx="3472223" cy="495173"/>
+          </a:xfrm>
+          <a:prstGeom prst="roundRect">
+            <a:avLst>
+              <a:gd name="adj" fmla="val 5708"/>
+            </a:avLst>
+          </a:prstGeom>
+          <a:solidFill>
+            <a:schemeClr val="accent6">
+              <a:lumMod val="60000"/>
+              <a:lumOff val="40000"/>
+            </a:schemeClr>
+          </a:solidFill>
+          <a:ln w="12700"/>
+        </p:spPr>
+        <p:style>
+          <a:lnRef idx="2">
+            <a:schemeClr val="accent6">
+              <a:shade val="50000"/>
+            </a:schemeClr>
+          </a:lnRef>
+          <a:fillRef idx="1">
+            <a:schemeClr val="accent6"/>
+          </a:fillRef>
+          <a:effectRef idx="0">
+            <a:schemeClr val="accent6"/>
+          </a:effectRef>
+          <a:fontRef idx="minor">
+            <a:schemeClr val="lt1"/>
+          </a:fontRef>
+        </p:style>
+        <p:txBody>
+          <a:bodyPr rtlCol="0" anchor="ctr" anchorCtr="0"/>
+          <a:lstStyle/>
+          <a:p>
+            <a:pPr algn="ctr"/>
+            <a:r>
+              <a:rPr lang="en-US" dirty="0">
+                <a:solidFill>
+                  <a:schemeClr val="tx1"/>
+                </a:solidFill>
+              </a:rPr>
+              <a:t>Scene</a:t>
+            </a:r>
+            <a:endParaRPr lang="en-SG" dirty="0">
+              <a:solidFill>
+                <a:schemeClr val="tx1"/>
+              </a:solidFill>
+            </a:endParaRPr>
+          </a:p>
+        </p:txBody>
+      </p:sp>
+      <p:sp>
+        <p:nvSpPr>
+          <p:cNvPr id="54" name="Rectangle: Rounded Corners 53">
+            <a:extLst>
+              <a:ext uri="{FF2B5EF4-FFF2-40B4-BE49-F238E27FC236}">
+                <a16:creationId xmlns:a16="http://schemas.microsoft.com/office/drawing/2014/main" id="{E0B517EE-5EAC-4705-9AEE-7F2D4CDD6615}"/>
+              </a:ext>
+            </a:extLst>
+          </p:cNvPr>
+          <p:cNvSpPr/>
+          <p:nvPr/>
+        </p:nvSpPr>
+        <p:spPr>
+          <a:xfrm>
+            <a:off x="3922874" y="4161030"/>
+            <a:ext cx="2019955" cy="495173"/>
+          </a:xfrm>
+          <a:prstGeom prst="roundRect">
+            <a:avLst>
+              <a:gd name="adj" fmla="val 5708"/>
+            </a:avLst>
+          </a:prstGeom>
+          <a:solidFill>
+            <a:schemeClr val="accent5">
+              <a:lumMod val="40000"/>
+              <a:lumOff val="60000"/>
+            </a:schemeClr>
+          </a:solidFill>
+          <a:ln/>
+        </p:spPr>
+        <p:style>
+          <a:lnRef idx="2">
+            <a:schemeClr val="accent5">
+              <a:shade val="50000"/>
+            </a:schemeClr>
+          </a:lnRef>
+          <a:fillRef idx="1">
+            <a:schemeClr val="accent5"/>
+          </a:fillRef>
+          <a:effectRef idx="0">
+            <a:schemeClr val="accent5"/>
+          </a:effectRef>
+          <a:fontRef idx="minor">
+            <a:schemeClr val="lt1"/>
+          </a:fontRef>
+        </p:style>
+        <p:txBody>
+          <a:bodyPr rtlCol="0" anchor="ctr" anchorCtr="0"/>
+          <a:lstStyle/>
+          <a:p>
+            <a:pPr algn="ctr"/>
+            <a:r>
+              <a:rPr lang="en-US" dirty="0" err="1">
+                <a:solidFill>
+                  <a:schemeClr val="tx1"/>
+                </a:solidFill>
+              </a:rPr>
+              <a:t>WidgetManager</a:t>
+            </a:r>
+            <a:endParaRPr lang="en-SG" dirty="0">
+              <a:solidFill>
+                <a:schemeClr val="tx1"/>
+              </a:solidFill>
+            </a:endParaRPr>
+          </a:p>
+        </p:txBody>
+      </p:sp>
+      <p:sp>
+        <p:nvSpPr>
+          <p:cNvPr id="55" name="Rectangle: Rounded Corners 54">
+            <a:extLst>
+              <a:ext uri="{FF2B5EF4-FFF2-40B4-BE49-F238E27FC236}">
+                <a16:creationId xmlns:a16="http://schemas.microsoft.com/office/drawing/2014/main" id="{CDC75476-690C-498A-BED5-CC73A2589BF8}"/>
+              </a:ext>
+            </a:extLst>
+          </p:cNvPr>
+          <p:cNvSpPr/>
+          <p:nvPr/>
+        </p:nvSpPr>
+        <p:spPr>
+          <a:xfrm>
+            <a:off x="3922872" y="4903789"/>
+            <a:ext cx="3472223" cy="495173"/>
+          </a:xfrm>
+          <a:prstGeom prst="roundRect">
+            <a:avLst>
+              <a:gd name="adj" fmla="val 5708"/>
+            </a:avLst>
+          </a:prstGeom>
+          <a:solidFill>
+            <a:schemeClr val="accent3">
+              <a:lumMod val="60000"/>
+              <a:lumOff val="40000"/>
+            </a:schemeClr>
+          </a:solidFill>
+          <a:ln w="12700"/>
+        </p:spPr>
+        <p:style>
+          <a:lnRef idx="2">
+            <a:schemeClr val="accent3">
+              <a:shade val="50000"/>
+            </a:schemeClr>
+          </a:lnRef>
+          <a:fillRef idx="1">
+            <a:schemeClr val="accent3"/>
+          </a:fillRef>
+          <a:effectRef idx="0">
+            <a:schemeClr val="accent3"/>
+          </a:effectRef>
+          <a:fontRef idx="minor">
+            <a:schemeClr val="lt1"/>
+          </a:fontRef>
+        </p:style>
+        <p:txBody>
+          <a:bodyPr rtlCol="0" anchor="ctr" anchorCtr="0"/>
+          <a:lstStyle/>
+          <a:p>
+            <a:pPr algn="ctr"/>
+            <a:r>
+              <a:rPr lang="en-US" dirty="0" err="1">
+                <a:solidFill>
+                  <a:schemeClr val="tx1"/>
+                </a:solidFill>
+              </a:rPr>
+              <a:t>ModelManager</a:t>
+            </a:r>
+            <a:endParaRPr lang="en-SG" dirty="0">
+              <a:solidFill>
+                <a:schemeClr val="tx1"/>
+              </a:solidFill>
+            </a:endParaRPr>
+          </a:p>
+        </p:txBody>
+      </p:sp>
+      <p:cxnSp>
+        <p:nvCxnSpPr>
+          <p:cNvPr id="56" name="Straight Arrow Connector 55">
+            <a:extLst>
+              <a:ext uri="{FF2B5EF4-FFF2-40B4-BE49-F238E27FC236}">
+                <a16:creationId xmlns:a16="http://schemas.microsoft.com/office/drawing/2014/main" id="{ACE32BA4-91C2-46B1-AEAB-85F9081E1755}"/>
+              </a:ext>
+            </a:extLst>
+          </p:cNvPr>
+          <p:cNvCxnSpPr>
+            <a:cxnSpLocks/>
+          </p:cNvCxnSpPr>
+          <p:nvPr/>
+        </p:nvCxnSpPr>
+        <p:spPr>
+          <a:xfrm>
+            <a:off x="4165883" y="2517347"/>
+            <a:ext cx="0" cy="238101"/>
+          </a:xfrm>
+          <a:prstGeom prst="straightConnector1">
+            <a:avLst/>
+          </a:prstGeom>
+          <a:ln w="38100">
+            <a:solidFill>
+              <a:srgbClr val="FF0000"/>
+            </a:solidFill>
+            <a:prstDash val="solid"/>
+            <a:tailEnd type="arrow" w="med" len="med"/>
+          </a:ln>
+        </p:spPr>
+        <p:style>
+          <a:lnRef idx="1">
+            <a:schemeClr val="dk1"/>
+          </a:lnRef>
+          <a:fillRef idx="0">
+            <a:schemeClr val="dk1"/>
+          </a:fillRef>
+          <a:effectRef idx="0">
+            <a:schemeClr val="dk1"/>
+          </a:effectRef>
+          <a:fontRef idx="minor">
+            <a:schemeClr val="tx1"/>
+          </a:fontRef>
+        </p:style>
+      </p:cxnSp>
+      <p:cxnSp>
+        <p:nvCxnSpPr>
+          <p:cNvPr id="57" name="Straight Arrow Connector 56">
+            <a:extLst>
+              <a:ext uri="{FF2B5EF4-FFF2-40B4-BE49-F238E27FC236}">
+                <a16:creationId xmlns:a16="http://schemas.microsoft.com/office/drawing/2014/main" id="{D28F9F64-45F4-4D66-BD0E-AF65A12B1F5F}"/>
+              </a:ext>
+            </a:extLst>
+          </p:cNvPr>
+          <p:cNvCxnSpPr>
+            <a:cxnSpLocks/>
+          </p:cNvCxnSpPr>
+          <p:nvPr/>
+        </p:nvCxnSpPr>
+        <p:spPr>
+          <a:xfrm flipV="1">
+            <a:off x="4427378" y="2507863"/>
+            <a:ext cx="0" cy="238100"/>
+          </a:xfrm>
+          <a:prstGeom prst="straightConnector1">
+            <a:avLst/>
+          </a:prstGeom>
+          <a:ln w="38100">
+            <a:solidFill>
+              <a:srgbClr val="0070C0"/>
+            </a:solidFill>
+            <a:prstDash val="solid"/>
+            <a:tailEnd type="arrow" w="med" len="med"/>
+          </a:ln>
+        </p:spPr>
+        <p:style>
+          <a:lnRef idx="1">
+            <a:schemeClr val="dk1"/>
+          </a:lnRef>
+          <a:fillRef idx="0">
+            <a:schemeClr val="dk1"/>
+          </a:fillRef>
+          <a:effectRef idx="0">
+            <a:schemeClr val="dk1"/>
+          </a:effectRef>
+          <a:fontRef idx="minor">
+            <a:schemeClr val="tx1"/>
+          </a:fontRef>
+        </p:style>
+      </p:cxnSp>
+      <p:cxnSp>
+        <p:nvCxnSpPr>
+          <p:cNvPr id="58" name="Straight Arrow Connector 57">
+            <a:extLst>
+              <a:ext uri="{FF2B5EF4-FFF2-40B4-BE49-F238E27FC236}">
+                <a16:creationId xmlns:a16="http://schemas.microsoft.com/office/drawing/2014/main" id="{3CB0EECD-79BB-4270-82D0-13F240994F7C}"/>
+              </a:ext>
+            </a:extLst>
+          </p:cNvPr>
+          <p:cNvCxnSpPr>
+            <a:cxnSpLocks/>
+          </p:cNvCxnSpPr>
+          <p:nvPr/>
+        </p:nvCxnSpPr>
+        <p:spPr>
+          <a:xfrm>
+            <a:off x="5633146" y="1961675"/>
+            <a:ext cx="0" cy="793773"/>
+          </a:xfrm>
+          <a:prstGeom prst="straightConnector1">
+            <a:avLst/>
+          </a:prstGeom>
+          <a:ln w="25400">
+            <a:solidFill>
+              <a:schemeClr val="accent6"/>
+            </a:solidFill>
+            <a:prstDash val="solid"/>
+            <a:tailEnd type="arrow" w="lg" len="lg"/>
+          </a:ln>
+        </p:spPr>
+        <p:style>
+          <a:lnRef idx="1">
+            <a:schemeClr val="dk1"/>
+          </a:lnRef>
+          <a:fillRef idx="0">
+            <a:schemeClr val="dk1"/>
+          </a:fillRef>
+          <a:effectRef idx="0">
+            <a:schemeClr val="dk1"/>
+          </a:effectRef>
+          <a:fontRef idx="minor">
+            <a:schemeClr val="tx1"/>
+          </a:fontRef>
+        </p:style>
+      </p:cxnSp>
+      <p:cxnSp>
+        <p:nvCxnSpPr>
+          <p:cNvPr id="59" name="Straight Arrow Connector 58">
+            <a:extLst>
+              <a:ext uri="{FF2B5EF4-FFF2-40B4-BE49-F238E27FC236}">
+                <a16:creationId xmlns:a16="http://schemas.microsoft.com/office/drawing/2014/main" id="{3881AEC5-349B-41C0-B0ED-0F7A4C7C3F87}"/>
+              </a:ext>
+            </a:extLst>
+          </p:cNvPr>
+          <p:cNvCxnSpPr>
+            <a:cxnSpLocks/>
+          </p:cNvCxnSpPr>
+          <p:nvPr/>
+        </p:nvCxnSpPr>
+        <p:spPr>
+          <a:xfrm>
+            <a:off x="4155328" y="3204825"/>
+            <a:ext cx="0" cy="238101"/>
+          </a:xfrm>
+          <a:prstGeom prst="straightConnector1">
+            <a:avLst/>
+          </a:prstGeom>
+          <a:ln w="38100">
+            <a:solidFill>
+              <a:srgbClr val="FF0000"/>
+            </a:solidFill>
+            <a:prstDash val="solid"/>
+            <a:tailEnd type="arrow" w="med" len="med"/>
+          </a:ln>
+        </p:spPr>
+        <p:style>
+          <a:lnRef idx="1">
+            <a:schemeClr val="dk1"/>
+          </a:lnRef>
+          <a:fillRef idx="0">
+            <a:schemeClr val="dk1"/>
+          </a:fillRef>
+          <a:effectRef idx="0">
+            <a:schemeClr val="dk1"/>
+          </a:effectRef>
+          <a:fontRef idx="minor">
+            <a:schemeClr val="tx1"/>
+          </a:fontRef>
+        </p:style>
+      </p:cxnSp>
+      <p:cxnSp>
+        <p:nvCxnSpPr>
+          <p:cNvPr id="61" name="Straight Arrow Connector 60">
+            <a:extLst>
+              <a:ext uri="{FF2B5EF4-FFF2-40B4-BE49-F238E27FC236}">
+                <a16:creationId xmlns:a16="http://schemas.microsoft.com/office/drawing/2014/main" id="{A75D0BAF-4C9E-4B5D-84B6-7DF7C99DBCD0}"/>
+              </a:ext>
+            </a:extLst>
+          </p:cNvPr>
+          <p:cNvCxnSpPr>
+            <a:cxnSpLocks/>
+          </p:cNvCxnSpPr>
+          <p:nvPr/>
+        </p:nvCxnSpPr>
+        <p:spPr>
+          <a:xfrm>
+            <a:off x="4155327" y="3932318"/>
+            <a:ext cx="0" cy="238101"/>
+          </a:xfrm>
+          <a:prstGeom prst="straightConnector1">
+            <a:avLst/>
+          </a:prstGeom>
+          <a:ln w="38100">
+            <a:solidFill>
+              <a:srgbClr val="FF0000"/>
+            </a:solidFill>
+            <a:prstDash val="solid"/>
+            <a:tailEnd type="arrow" w="med" len="med"/>
+          </a:ln>
+        </p:spPr>
+        <p:style>
+          <a:lnRef idx="1">
+            <a:schemeClr val="dk1"/>
+          </a:lnRef>
+          <a:fillRef idx="0">
+            <a:schemeClr val="dk1"/>
+          </a:fillRef>
+          <a:effectRef idx="0">
+            <a:schemeClr val="dk1"/>
+          </a:effectRef>
+          <a:fontRef idx="minor">
+            <a:schemeClr val="tx1"/>
+          </a:fontRef>
+        </p:style>
+      </p:cxnSp>
+      <p:cxnSp>
+        <p:nvCxnSpPr>
+          <p:cNvPr id="62" name="Straight Arrow Connector 61">
+            <a:extLst>
+              <a:ext uri="{FF2B5EF4-FFF2-40B4-BE49-F238E27FC236}">
+                <a16:creationId xmlns:a16="http://schemas.microsoft.com/office/drawing/2014/main" id="{B9E5F97E-19D3-4277-BE34-C541846F92E7}"/>
+              </a:ext>
+            </a:extLst>
+          </p:cNvPr>
+          <p:cNvCxnSpPr>
+            <a:cxnSpLocks/>
+          </p:cNvCxnSpPr>
+          <p:nvPr/>
+        </p:nvCxnSpPr>
+        <p:spPr>
+          <a:xfrm>
+            <a:off x="4155328" y="4665592"/>
+            <a:ext cx="0" cy="238101"/>
+          </a:xfrm>
+          <a:prstGeom prst="straightConnector1">
+            <a:avLst/>
+          </a:prstGeom>
+          <a:ln w="38100">
+            <a:solidFill>
+              <a:srgbClr val="FF0000"/>
+            </a:solidFill>
+            <a:prstDash val="solid"/>
+            <a:tailEnd type="arrow" w="med" len="med"/>
+          </a:ln>
+        </p:spPr>
+        <p:style>
+          <a:lnRef idx="1">
+            <a:schemeClr val="dk1"/>
+          </a:lnRef>
+          <a:fillRef idx="0">
+            <a:schemeClr val="dk1"/>
+          </a:fillRef>
+          <a:effectRef idx="0">
+            <a:schemeClr val="dk1"/>
+          </a:effectRef>
+          <a:fontRef idx="minor">
+            <a:schemeClr val="tx1"/>
+          </a:fontRef>
+        </p:style>
+      </p:cxnSp>
+      <p:cxnSp>
+        <p:nvCxnSpPr>
+          <p:cNvPr id="63" name="Straight Arrow Connector 62">
+            <a:extLst>
+              <a:ext uri="{FF2B5EF4-FFF2-40B4-BE49-F238E27FC236}">
+                <a16:creationId xmlns:a16="http://schemas.microsoft.com/office/drawing/2014/main" id="{52869B6A-9B18-44BE-854F-1348BA6F1467}"/>
+              </a:ext>
+            </a:extLst>
+          </p:cNvPr>
+          <p:cNvCxnSpPr>
+            <a:cxnSpLocks/>
+          </p:cNvCxnSpPr>
+          <p:nvPr/>
+        </p:nvCxnSpPr>
+        <p:spPr>
+          <a:xfrm>
+            <a:off x="7269018" y="1983817"/>
+            <a:ext cx="0" cy="1456596"/>
+          </a:xfrm>
+          <a:prstGeom prst="straightConnector1">
+            <a:avLst/>
+          </a:prstGeom>
+          <a:ln w="25400">
+            <a:solidFill>
+              <a:schemeClr val="accent6"/>
+            </a:solidFill>
+            <a:prstDash val="solid"/>
+            <a:tailEnd type="arrow" w="lg" len="lg"/>
+          </a:ln>
+        </p:spPr>
+        <p:style>
+          <a:lnRef idx="1">
+            <a:schemeClr val="dk1"/>
+          </a:lnRef>
+          <a:fillRef idx="0">
+            <a:schemeClr val="dk1"/>
+          </a:fillRef>
+          <a:effectRef idx="0">
+            <a:schemeClr val="dk1"/>
+          </a:effectRef>
+          <a:fontRef idx="minor">
+            <a:schemeClr val="tx1"/>
+          </a:fontRef>
+        </p:style>
+      </p:cxnSp>
+      <p:cxnSp>
+        <p:nvCxnSpPr>
+          <p:cNvPr id="64" name="Straight Arrow Connector 63">
+            <a:extLst>
+              <a:ext uri="{FF2B5EF4-FFF2-40B4-BE49-F238E27FC236}">
+                <a16:creationId xmlns:a16="http://schemas.microsoft.com/office/drawing/2014/main" id="{4BD6CD15-10C1-4945-B379-8C181C5D5472}"/>
+              </a:ext>
+            </a:extLst>
+          </p:cNvPr>
+          <p:cNvCxnSpPr>
+            <a:cxnSpLocks/>
+          </p:cNvCxnSpPr>
+          <p:nvPr/>
+        </p:nvCxnSpPr>
+        <p:spPr>
+          <a:xfrm flipV="1">
+            <a:off x="4427378" y="3932318"/>
+            <a:ext cx="0" cy="238101"/>
+          </a:xfrm>
+          <a:prstGeom prst="straightConnector1">
+            <a:avLst/>
+          </a:prstGeom>
+          <a:ln w="38100">
+            <a:solidFill>
+              <a:srgbClr val="0070C0"/>
+            </a:solidFill>
+            <a:prstDash val="solid"/>
+            <a:tailEnd type="arrow" w="med" len="med"/>
+          </a:ln>
+        </p:spPr>
+        <p:style>
+          <a:lnRef idx="1">
+            <a:schemeClr val="dk1"/>
+          </a:lnRef>
+          <a:fillRef idx="0">
+            <a:schemeClr val="dk1"/>
+          </a:fillRef>
+          <a:effectRef idx="0">
+            <a:schemeClr val="dk1"/>
+          </a:effectRef>
+          <a:fontRef idx="minor">
+            <a:schemeClr val="tx1"/>
+          </a:fontRef>
+        </p:style>
+      </p:cxnSp>
+      <p:cxnSp>
+        <p:nvCxnSpPr>
+          <p:cNvPr id="65" name="Straight Arrow Connector 64">
+            <a:extLst>
+              <a:ext uri="{FF2B5EF4-FFF2-40B4-BE49-F238E27FC236}">
+                <a16:creationId xmlns:a16="http://schemas.microsoft.com/office/drawing/2014/main" id="{FA9D7D84-67B8-4CDC-8C4B-7D7CD41CECDF}"/>
+              </a:ext>
+            </a:extLst>
+          </p:cNvPr>
+          <p:cNvCxnSpPr>
+            <a:cxnSpLocks/>
+          </p:cNvCxnSpPr>
+          <p:nvPr/>
+        </p:nvCxnSpPr>
+        <p:spPr>
+          <a:xfrm flipV="1">
+            <a:off x="6684139" y="3932415"/>
+            <a:ext cx="0" cy="971374"/>
+          </a:xfrm>
+          <a:prstGeom prst="straightConnector1">
+            <a:avLst/>
+          </a:prstGeom>
+          <a:ln w="38100">
+            <a:solidFill>
+              <a:srgbClr val="0070C0"/>
+            </a:solidFill>
+            <a:prstDash val="solid"/>
+            <a:tailEnd type="arrow" w="med" len="med"/>
+          </a:ln>
+        </p:spPr>
+        <p:style>
+          <a:lnRef idx="1">
+            <a:schemeClr val="dk1"/>
+          </a:lnRef>
+          <a:fillRef idx="0">
+            <a:schemeClr val="dk1"/>
+          </a:fillRef>
+          <a:effectRef idx="0">
+            <a:schemeClr val="dk1"/>
+          </a:effectRef>
+          <a:fontRef idx="minor">
+            <a:schemeClr val="tx1"/>
+          </a:fontRef>
+        </p:style>
+      </p:cxnSp>
+      <p:cxnSp>
+        <p:nvCxnSpPr>
+          <p:cNvPr id="67" name="Straight Arrow Connector 66">
+            <a:extLst>
+              <a:ext uri="{FF2B5EF4-FFF2-40B4-BE49-F238E27FC236}">
+                <a16:creationId xmlns:a16="http://schemas.microsoft.com/office/drawing/2014/main" id="{098650D2-5C06-4D32-8F15-E75FD295C12C}"/>
+              </a:ext>
+            </a:extLst>
+          </p:cNvPr>
+          <p:cNvCxnSpPr>
+            <a:cxnSpLocks/>
+          </p:cNvCxnSpPr>
+          <p:nvPr/>
+        </p:nvCxnSpPr>
+        <p:spPr>
+          <a:xfrm>
+            <a:off x="6528676" y="3934023"/>
+            <a:ext cx="0" cy="980861"/>
+          </a:xfrm>
+          <a:prstGeom prst="straightConnector1">
+            <a:avLst/>
+          </a:prstGeom>
+          <a:ln w="38100">
+            <a:solidFill>
+              <a:srgbClr val="FF0000"/>
+            </a:solidFill>
+            <a:prstDash val="solid"/>
+            <a:tailEnd type="arrow" w="med" len="med"/>
+          </a:ln>
+        </p:spPr>
+        <p:style>
+          <a:lnRef idx="1">
+            <a:schemeClr val="dk1"/>
+          </a:lnRef>
+          <a:fillRef idx="0">
+            <a:schemeClr val="dk1"/>
+          </a:fillRef>
+          <a:effectRef idx="0">
+            <a:schemeClr val="dk1"/>
+          </a:effectRef>
+          <a:fontRef idx="minor">
+            <a:schemeClr val="tx1"/>
+          </a:fontRef>
+        </p:style>
+      </p:cxnSp>
+      <p:cxnSp>
+        <p:nvCxnSpPr>
+          <p:cNvPr id="68" name="Straight Arrow Connector 67">
+            <a:extLst>
+              <a:ext uri="{FF2B5EF4-FFF2-40B4-BE49-F238E27FC236}">
+                <a16:creationId xmlns:a16="http://schemas.microsoft.com/office/drawing/2014/main" id="{0A7F6FE9-C295-4073-8AFF-A5FF06D70D5F}"/>
+              </a:ext>
+            </a:extLst>
+          </p:cNvPr>
+          <p:cNvCxnSpPr>
+            <a:cxnSpLocks/>
+          </p:cNvCxnSpPr>
+          <p:nvPr/>
+        </p:nvCxnSpPr>
+        <p:spPr>
+          <a:xfrm flipV="1">
+            <a:off x="4427378" y="3189559"/>
+            <a:ext cx="0" cy="238100"/>
+          </a:xfrm>
+          <a:prstGeom prst="straightConnector1">
+            <a:avLst/>
+          </a:prstGeom>
+          <a:ln w="38100">
+            <a:solidFill>
+              <a:srgbClr val="0070C0"/>
+            </a:solidFill>
+            <a:prstDash val="solid"/>
+            <a:tailEnd type="arrow" w="med" len="med"/>
+          </a:ln>
+        </p:spPr>
+        <p:style>
+          <a:lnRef idx="1">
+            <a:schemeClr val="dk1"/>
+          </a:lnRef>
+          <a:fillRef idx="0">
+            <a:schemeClr val="dk1"/>
+          </a:fillRef>
+          <a:effectRef idx="0">
+            <a:schemeClr val="dk1"/>
+          </a:effectRef>
+          <a:fontRef idx="minor">
+            <a:schemeClr val="tx1"/>
+          </a:fontRef>
+        </p:style>
+      </p:cxnSp>
+      <p:cxnSp>
+        <p:nvCxnSpPr>
+          <p:cNvPr id="70" name="Straight Arrow Connector 69">
+            <a:extLst>
+              <a:ext uri="{FF2B5EF4-FFF2-40B4-BE49-F238E27FC236}">
+                <a16:creationId xmlns:a16="http://schemas.microsoft.com/office/drawing/2014/main" id="{27351D8D-EA32-4A9B-8D86-09596C85C4D8}"/>
+              </a:ext>
+            </a:extLst>
+          </p:cNvPr>
+          <p:cNvCxnSpPr>
+            <a:cxnSpLocks/>
+          </p:cNvCxnSpPr>
+          <p:nvPr/>
+        </p:nvCxnSpPr>
+        <p:spPr>
+          <a:xfrm flipV="1">
+            <a:off x="4427378" y="4665592"/>
+            <a:ext cx="0" cy="238101"/>
+          </a:xfrm>
+          <a:prstGeom prst="straightConnector1">
+            <a:avLst/>
+          </a:prstGeom>
+          <a:ln w="38100">
+            <a:solidFill>
+              <a:srgbClr val="0070C0"/>
+            </a:solidFill>
+            <a:prstDash val="solid"/>
+            <a:tailEnd type="arrow" w="med" len="med"/>
+          </a:ln>
+        </p:spPr>
+        <p:style>
+          <a:lnRef idx="1">
+            <a:schemeClr val="dk1"/>
+          </a:lnRef>
+          <a:fillRef idx="0">
+            <a:schemeClr val="dk1"/>
+          </a:fillRef>
+          <a:effectRef idx="0">
+            <a:schemeClr val="dk1"/>
+          </a:effectRef>
+          <a:fontRef idx="minor">
+            <a:schemeClr val="tx1"/>
+          </a:fontRef>
+        </p:style>
+      </p:cxnSp>
+      <p:cxnSp>
+        <p:nvCxnSpPr>
+          <p:cNvPr id="71" name="Straight Arrow Connector 70">
+            <a:extLst>
+              <a:ext uri="{FF2B5EF4-FFF2-40B4-BE49-F238E27FC236}">
+                <a16:creationId xmlns:a16="http://schemas.microsoft.com/office/drawing/2014/main" id="{5363499A-FFE4-4E29-8426-6C0F316E94FB}"/>
+              </a:ext>
+            </a:extLst>
+          </p:cNvPr>
+          <p:cNvCxnSpPr>
+            <a:cxnSpLocks/>
+          </p:cNvCxnSpPr>
+          <p:nvPr/>
+        </p:nvCxnSpPr>
+        <p:spPr>
+          <a:xfrm flipV="1">
+            <a:off x="5759673" y="1949553"/>
+            <a:ext cx="0" cy="2211477"/>
+          </a:xfrm>
+          <a:prstGeom prst="straightConnector1">
+            <a:avLst/>
+          </a:prstGeom>
+          <a:ln w="25400">
+            <a:solidFill>
+              <a:schemeClr val="accent6"/>
+            </a:solidFill>
+            <a:prstDash val="solid"/>
+            <a:tailEnd type="arrow" w="lg" len="lg"/>
+          </a:ln>
+        </p:spPr>
+        <p:style>
+          <a:lnRef idx="1">
+            <a:schemeClr val="dk1"/>
+          </a:lnRef>
+          <a:fillRef idx="0">
+            <a:schemeClr val="dk1"/>
+          </a:fillRef>
+          <a:effectRef idx="0">
+            <a:schemeClr val="dk1"/>
+          </a:effectRef>
+          <a:fontRef idx="minor">
+            <a:schemeClr val="tx1"/>
+          </a:fontRef>
+        </p:style>
+      </p:cxnSp>
+      <p:sp>
+        <p:nvSpPr>
+          <p:cNvPr id="73" name="TextBox 72">
+            <a:extLst>
+              <a:ext uri="{FF2B5EF4-FFF2-40B4-BE49-F238E27FC236}">
+                <a16:creationId xmlns:a16="http://schemas.microsoft.com/office/drawing/2014/main" id="{44328503-713B-4A9F-9D78-29437DE19602}"/>
+              </a:ext>
+            </a:extLst>
+          </p:cNvPr>
+          <p:cNvSpPr txBox="1"/>
+          <p:nvPr/>
+        </p:nvSpPr>
+        <p:spPr>
+          <a:xfrm>
+            <a:off x="8519905" y="1483820"/>
+            <a:ext cx="1777224" cy="923330"/>
+          </a:xfrm>
+          <a:prstGeom prst="rect">
+            <a:avLst/>
+          </a:prstGeom>
+          <a:noFill/>
+        </p:spPr>
+        <p:txBody>
+          <a:bodyPr wrap="square" rtlCol="0">
+            <a:spAutoFit/>
+          </a:bodyPr>
+          <a:lstStyle/>
+          <a:p>
+            <a:r>
+              <a:rPr lang="en-US" dirty="0">
+                <a:solidFill>
+                  <a:srgbClr val="FF0000"/>
+                </a:solidFill>
+              </a:rPr>
+              <a:t>Input passing</a:t>
+            </a:r>
+          </a:p>
+          <a:p>
+            <a:r>
+              <a:rPr lang="en-US" dirty="0">
+                <a:solidFill>
+                  <a:srgbClr val="0070C0"/>
+                </a:solidFill>
+              </a:rPr>
+              <a:t>Output retrieval</a:t>
+            </a:r>
+          </a:p>
+          <a:p>
+            <a:r>
+              <a:rPr lang="en-US" dirty="0">
+                <a:solidFill>
+                  <a:schemeClr val="accent6"/>
+                </a:solidFill>
+              </a:rPr>
+              <a:t>Commands</a:t>
+            </a:r>
+          </a:p>
+        </p:txBody>
+      </p:sp>
+      <p:cxnSp>
+        <p:nvCxnSpPr>
+          <p:cNvPr id="74" name="Straight Arrow Connector 73">
+            <a:extLst>
+              <a:ext uri="{FF2B5EF4-FFF2-40B4-BE49-F238E27FC236}">
+                <a16:creationId xmlns:a16="http://schemas.microsoft.com/office/drawing/2014/main" id="{497BB6B8-25F6-47E4-8A79-6047FF287A8E}"/>
+              </a:ext>
+            </a:extLst>
+          </p:cNvPr>
+          <p:cNvCxnSpPr>
+            <a:cxnSpLocks/>
+          </p:cNvCxnSpPr>
+          <p:nvPr/>
+        </p:nvCxnSpPr>
+        <p:spPr>
+          <a:xfrm>
+            <a:off x="7968871" y="1703766"/>
+            <a:ext cx="551034" cy="0"/>
+          </a:xfrm>
+          <a:prstGeom prst="straightConnector1">
+            <a:avLst/>
+          </a:prstGeom>
+          <a:ln w="38100">
+            <a:solidFill>
+              <a:srgbClr val="FF0000"/>
+            </a:solidFill>
+            <a:prstDash val="solid"/>
+            <a:tailEnd type="arrow" w="med" len="med"/>
+          </a:ln>
+        </p:spPr>
+        <p:style>
+          <a:lnRef idx="1">
+            <a:schemeClr val="dk1"/>
+          </a:lnRef>
+          <a:fillRef idx="0">
+            <a:schemeClr val="dk1"/>
+          </a:fillRef>
+          <a:effectRef idx="0">
+            <a:schemeClr val="dk1"/>
+          </a:effectRef>
+          <a:fontRef idx="minor">
+            <a:schemeClr val="tx1"/>
+          </a:fontRef>
+        </p:style>
+      </p:cxnSp>
+      <p:cxnSp>
+        <p:nvCxnSpPr>
+          <p:cNvPr id="76" name="Straight Arrow Connector 75">
+            <a:extLst>
+              <a:ext uri="{FF2B5EF4-FFF2-40B4-BE49-F238E27FC236}">
+                <a16:creationId xmlns:a16="http://schemas.microsoft.com/office/drawing/2014/main" id="{08675A47-1023-4015-9B16-E0C952C5FE91}"/>
+              </a:ext>
+            </a:extLst>
+          </p:cNvPr>
+          <p:cNvCxnSpPr>
+            <a:cxnSpLocks/>
+          </p:cNvCxnSpPr>
+          <p:nvPr/>
+        </p:nvCxnSpPr>
+        <p:spPr>
+          <a:xfrm>
+            <a:off x="7968871" y="1945485"/>
+            <a:ext cx="551034" cy="0"/>
+          </a:xfrm>
+          <a:prstGeom prst="straightConnector1">
+            <a:avLst/>
+          </a:prstGeom>
+          <a:ln w="38100">
+            <a:solidFill>
+              <a:srgbClr val="0070C0"/>
+            </a:solidFill>
+            <a:prstDash val="solid"/>
+            <a:tailEnd type="arrow" w="med" len="med"/>
+          </a:ln>
+        </p:spPr>
+        <p:style>
+          <a:lnRef idx="1">
+            <a:schemeClr val="dk1"/>
+          </a:lnRef>
+          <a:fillRef idx="0">
+            <a:schemeClr val="dk1"/>
+          </a:fillRef>
+          <a:effectRef idx="0">
+            <a:schemeClr val="dk1"/>
+          </a:effectRef>
+          <a:fontRef idx="minor">
+            <a:schemeClr val="tx1"/>
+          </a:fontRef>
+        </p:style>
+      </p:cxnSp>
+      <p:cxnSp>
+        <p:nvCxnSpPr>
+          <p:cNvPr id="79" name="Straight Arrow Connector 78">
+            <a:extLst>
+              <a:ext uri="{FF2B5EF4-FFF2-40B4-BE49-F238E27FC236}">
+                <a16:creationId xmlns:a16="http://schemas.microsoft.com/office/drawing/2014/main" id="{FA7CA1BA-B557-40AA-8962-EA81B2EA984D}"/>
+              </a:ext>
+            </a:extLst>
+          </p:cNvPr>
+          <p:cNvCxnSpPr>
+            <a:cxnSpLocks/>
+          </p:cNvCxnSpPr>
+          <p:nvPr/>
+        </p:nvCxnSpPr>
+        <p:spPr>
+          <a:xfrm>
+            <a:off x="7968871" y="2235694"/>
+            <a:ext cx="538650" cy="1"/>
+          </a:xfrm>
+          <a:prstGeom prst="straightConnector1">
+            <a:avLst/>
+          </a:prstGeom>
+          <a:ln w="25400">
+            <a:solidFill>
+              <a:schemeClr val="accent6"/>
+            </a:solidFill>
+            <a:prstDash val="solid"/>
+            <a:tailEnd type="arrow" w="lg" len="lg"/>
+          </a:ln>
+        </p:spPr>
+        <p:style>
+          <a:lnRef idx="1">
+            <a:schemeClr val="dk1"/>
+          </a:lnRef>
+          <a:fillRef idx="0">
+            <a:schemeClr val="dk1"/>
+          </a:fillRef>
+          <a:effectRef idx="0">
+            <a:schemeClr val="dk1"/>
+          </a:effectRef>
+          <a:fontRef idx="minor">
+            <a:schemeClr val="tx1"/>
+          </a:fontRef>
+        </p:style>
+      </p:cxnSp>
+      <p:sp>
+        <p:nvSpPr>
+          <p:cNvPr id="82" name="TextBox 81">
+            <a:extLst>
+              <a:ext uri="{FF2B5EF4-FFF2-40B4-BE49-F238E27FC236}">
+                <a16:creationId xmlns:a16="http://schemas.microsoft.com/office/drawing/2014/main" id="{0A734CA7-4B9F-420A-BE41-0512E7566AA5}"/>
+              </a:ext>
+            </a:extLst>
+          </p:cNvPr>
+          <p:cNvSpPr txBox="1"/>
+          <p:nvPr/>
+        </p:nvSpPr>
+        <p:spPr>
+          <a:xfrm>
+            <a:off x="4800906" y="1949553"/>
+            <a:ext cx="918473" cy="461665"/>
+          </a:xfrm>
+          <a:prstGeom prst="rect">
+            <a:avLst/>
+          </a:prstGeom>
+          <a:noFill/>
+        </p:spPr>
+        <p:txBody>
+          <a:bodyPr wrap="square" rtlCol="0">
+            <a:spAutoFit/>
+          </a:bodyPr>
+          <a:lstStyle/>
+          <a:p>
+            <a:r>
+              <a:rPr lang="en-US" sz="1200" dirty="0">
+                <a:solidFill>
+                  <a:schemeClr val="accent6"/>
+                </a:solidFill>
+              </a:rPr>
+              <a:t>Input, draw commands</a:t>
+            </a:r>
+          </a:p>
+        </p:txBody>
+      </p:sp>
+      <p:sp>
+        <p:nvSpPr>
+          <p:cNvPr id="84" name="TextBox 83">
+            <a:extLst>
+              <a:ext uri="{FF2B5EF4-FFF2-40B4-BE49-F238E27FC236}">
+                <a16:creationId xmlns:a16="http://schemas.microsoft.com/office/drawing/2014/main" id="{D458513D-08D3-4645-B773-A48422F587BB}"/>
+              </a:ext>
+            </a:extLst>
+          </p:cNvPr>
+          <p:cNvSpPr txBox="1"/>
+          <p:nvPr/>
+        </p:nvSpPr>
+        <p:spPr>
+          <a:xfrm>
+            <a:off x="6656395" y="3104534"/>
+            <a:ext cx="621612" cy="276999"/>
+          </a:xfrm>
+          <a:prstGeom prst="rect">
+            <a:avLst/>
+          </a:prstGeom>
+          <a:noFill/>
+        </p:spPr>
+        <p:txBody>
+          <a:bodyPr wrap="square" rtlCol="0">
+            <a:spAutoFit/>
+          </a:bodyPr>
+          <a:lstStyle/>
+          <a:p>
+            <a:r>
+              <a:rPr lang="en-US" sz="1200" dirty="0" err="1">
+                <a:solidFill>
+                  <a:schemeClr val="accent6"/>
+                </a:solidFill>
+              </a:rPr>
+              <a:t>doTick</a:t>
+            </a:r>
+            <a:endParaRPr lang="en-US" sz="1200" dirty="0">
+              <a:solidFill>
+                <a:schemeClr val="accent6"/>
+              </a:solidFill>
+            </a:endParaRPr>
+          </a:p>
+        </p:txBody>
+      </p:sp>
+      <p:sp>
+        <p:nvSpPr>
+          <p:cNvPr id="85" name="TextBox 84">
+            <a:extLst>
+              <a:ext uri="{FF2B5EF4-FFF2-40B4-BE49-F238E27FC236}">
+                <a16:creationId xmlns:a16="http://schemas.microsoft.com/office/drawing/2014/main" id="{0EF806D3-401F-4824-9A08-E418EE88FE9C}"/>
+              </a:ext>
+            </a:extLst>
+          </p:cNvPr>
+          <p:cNvSpPr txBox="1"/>
+          <p:nvPr/>
+        </p:nvSpPr>
+        <p:spPr>
+          <a:xfrm>
+            <a:off x="5802528" y="2102082"/>
+            <a:ext cx="794010" cy="276999"/>
+          </a:xfrm>
+          <a:prstGeom prst="rect">
+            <a:avLst/>
+          </a:prstGeom>
+          <a:noFill/>
+        </p:spPr>
+        <p:txBody>
+          <a:bodyPr wrap="square" rtlCol="0">
+            <a:spAutoFit/>
+          </a:bodyPr>
+          <a:lstStyle/>
+          <a:p>
+            <a:r>
+              <a:rPr lang="en-US" sz="1200" dirty="0">
+                <a:solidFill>
+                  <a:schemeClr val="accent6"/>
+                </a:solidFill>
+              </a:rPr>
+              <a:t>Messages</a:t>
+            </a:r>
+          </a:p>
+        </p:txBody>
+      </p:sp>
+      <p:sp>
+        <p:nvSpPr>
+          <p:cNvPr id="86" name="TextBox 85">
+            <a:extLst>
+              <a:ext uri="{FF2B5EF4-FFF2-40B4-BE49-F238E27FC236}">
+                <a16:creationId xmlns:a16="http://schemas.microsoft.com/office/drawing/2014/main" id="{89BB9CD4-0CDB-4F03-A69D-471E5FAF79D8}"/>
+              </a:ext>
+            </a:extLst>
+          </p:cNvPr>
+          <p:cNvSpPr txBox="1"/>
+          <p:nvPr/>
+        </p:nvSpPr>
+        <p:spPr>
+          <a:xfrm>
+            <a:off x="2994566" y="2492352"/>
+            <a:ext cx="1114303" cy="276999"/>
+          </a:xfrm>
+          <a:prstGeom prst="rect">
+            <a:avLst/>
+          </a:prstGeom>
+          <a:noFill/>
+        </p:spPr>
+        <p:txBody>
+          <a:bodyPr wrap="square" rtlCol="0">
+            <a:spAutoFit/>
+          </a:bodyPr>
+          <a:lstStyle/>
+          <a:p>
+            <a:r>
+              <a:rPr lang="en-US" sz="1200" dirty="0">
+                <a:solidFill>
+                  <a:srgbClr val="FF0000"/>
+                </a:solidFill>
+              </a:rPr>
+              <a:t>Window, K+M</a:t>
+            </a:r>
+          </a:p>
+        </p:txBody>
+      </p:sp>
+      <p:sp>
+        <p:nvSpPr>
+          <p:cNvPr id="87" name="TextBox 86">
+            <a:extLst>
+              <a:ext uri="{FF2B5EF4-FFF2-40B4-BE49-F238E27FC236}">
+                <a16:creationId xmlns:a16="http://schemas.microsoft.com/office/drawing/2014/main" id="{1901F27A-5CE5-4BD4-A145-2F66D45A409F}"/>
+              </a:ext>
+            </a:extLst>
+          </p:cNvPr>
+          <p:cNvSpPr txBox="1"/>
+          <p:nvPr/>
+        </p:nvSpPr>
+        <p:spPr>
+          <a:xfrm>
+            <a:off x="4474977" y="2496895"/>
+            <a:ext cx="569572" cy="276999"/>
+          </a:xfrm>
+          <a:prstGeom prst="rect">
+            <a:avLst/>
+          </a:prstGeom>
+          <a:noFill/>
+        </p:spPr>
+        <p:txBody>
+          <a:bodyPr wrap="square" rtlCol="0">
+            <a:spAutoFit/>
+          </a:bodyPr>
+          <a:lstStyle/>
+          <a:p>
+            <a:r>
+              <a:rPr lang="en-US" sz="1200" dirty="0">
+                <a:solidFill>
+                  <a:srgbClr val="0070C0"/>
+                </a:solidFill>
+              </a:rPr>
+              <a:t>Draw</a:t>
+            </a:r>
+          </a:p>
+        </p:txBody>
+      </p:sp>
+      <p:sp>
+        <p:nvSpPr>
+          <p:cNvPr id="89" name="TextBox 88">
+            <a:extLst>
+              <a:ext uri="{FF2B5EF4-FFF2-40B4-BE49-F238E27FC236}">
+                <a16:creationId xmlns:a16="http://schemas.microsoft.com/office/drawing/2014/main" id="{CFC2B295-75DB-4FA7-AE12-628D0F0B1C8C}"/>
+              </a:ext>
+            </a:extLst>
+          </p:cNvPr>
+          <p:cNvSpPr txBox="1"/>
+          <p:nvPr/>
+        </p:nvSpPr>
+        <p:spPr>
+          <a:xfrm>
+            <a:off x="4463738" y="3193057"/>
+            <a:ext cx="569572" cy="276999"/>
+          </a:xfrm>
+          <a:prstGeom prst="rect">
+            <a:avLst/>
+          </a:prstGeom>
+          <a:noFill/>
+        </p:spPr>
+        <p:txBody>
+          <a:bodyPr wrap="square" rtlCol="0">
+            <a:spAutoFit/>
+          </a:bodyPr>
+          <a:lstStyle/>
+          <a:p>
+            <a:r>
+              <a:rPr lang="en-US" sz="1200" dirty="0">
+                <a:solidFill>
+                  <a:srgbClr val="0070C0"/>
+                </a:solidFill>
+              </a:rPr>
+              <a:t>Draw</a:t>
+            </a:r>
+          </a:p>
+        </p:txBody>
+      </p:sp>
+      <p:sp>
+        <p:nvSpPr>
+          <p:cNvPr id="90" name="TextBox 89">
+            <a:extLst>
+              <a:ext uri="{FF2B5EF4-FFF2-40B4-BE49-F238E27FC236}">
+                <a16:creationId xmlns:a16="http://schemas.microsoft.com/office/drawing/2014/main" id="{604A8F51-8487-4DBE-8B7A-30951C1202B0}"/>
+              </a:ext>
+            </a:extLst>
+          </p:cNvPr>
+          <p:cNvSpPr txBox="1"/>
+          <p:nvPr/>
+        </p:nvSpPr>
+        <p:spPr>
+          <a:xfrm>
+            <a:off x="3622113" y="3189559"/>
+            <a:ext cx="520012" cy="276999"/>
+          </a:xfrm>
+          <a:prstGeom prst="rect">
+            <a:avLst/>
+          </a:prstGeom>
+          <a:noFill/>
+        </p:spPr>
+        <p:txBody>
+          <a:bodyPr wrap="square" rtlCol="0">
+            <a:spAutoFit/>
+          </a:bodyPr>
+          <a:lstStyle/>
+          <a:p>
+            <a:r>
+              <a:rPr lang="en-US" sz="1200" dirty="0">
+                <a:solidFill>
+                  <a:srgbClr val="FF0000"/>
+                </a:solidFill>
+              </a:rPr>
+              <a:t>K+M</a:t>
+            </a:r>
+          </a:p>
+        </p:txBody>
+      </p:sp>
+      <p:sp>
+        <p:nvSpPr>
+          <p:cNvPr id="92" name="TextBox 91">
+            <a:extLst>
+              <a:ext uri="{FF2B5EF4-FFF2-40B4-BE49-F238E27FC236}">
+                <a16:creationId xmlns:a16="http://schemas.microsoft.com/office/drawing/2014/main" id="{C960F621-42B5-4CFF-A80A-7FFBFD2F6BE8}"/>
+              </a:ext>
+            </a:extLst>
+          </p:cNvPr>
+          <p:cNvSpPr txBox="1"/>
+          <p:nvPr/>
+        </p:nvSpPr>
+        <p:spPr>
+          <a:xfrm>
+            <a:off x="2955805" y="3914678"/>
+            <a:ext cx="1174169" cy="276999"/>
+          </a:xfrm>
+          <a:prstGeom prst="rect">
+            <a:avLst/>
+          </a:prstGeom>
+          <a:noFill/>
+        </p:spPr>
+        <p:txBody>
+          <a:bodyPr wrap="square" rtlCol="0">
+            <a:spAutoFit/>
+          </a:bodyPr>
+          <a:lstStyle/>
+          <a:p>
+            <a:r>
+              <a:rPr lang="en-US" sz="1200" dirty="0">
+                <a:solidFill>
+                  <a:srgbClr val="FF0000"/>
+                </a:solidFill>
+              </a:rPr>
+              <a:t>Widget clicked?</a:t>
+            </a:r>
+          </a:p>
+        </p:txBody>
+      </p:sp>
+      <p:sp>
+        <p:nvSpPr>
+          <p:cNvPr id="93" name="TextBox 92">
+            <a:extLst>
+              <a:ext uri="{FF2B5EF4-FFF2-40B4-BE49-F238E27FC236}">
+                <a16:creationId xmlns:a16="http://schemas.microsoft.com/office/drawing/2014/main" id="{0F1281A4-D30C-4D5B-BB66-120C48F722C4}"/>
+              </a:ext>
+            </a:extLst>
+          </p:cNvPr>
+          <p:cNvSpPr txBox="1"/>
+          <p:nvPr/>
+        </p:nvSpPr>
+        <p:spPr>
+          <a:xfrm>
+            <a:off x="5886200" y="3935511"/>
+            <a:ext cx="811040" cy="461665"/>
+          </a:xfrm>
+          <a:prstGeom prst="rect">
+            <a:avLst/>
+          </a:prstGeom>
+          <a:noFill/>
+        </p:spPr>
+        <p:txBody>
+          <a:bodyPr wrap="square" rtlCol="0">
+            <a:spAutoFit/>
+          </a:bodyPr>
+          <a:lstStyle/>
+          <a:p>
+            <a:r>
+              <a:rPr lang="en-US" sz="1200" dirty="0">
+                <a:solidFill>
+                  <a:srgbClr val="FF0000"/>
+                </a:solidFill>
+              </a:rPr>
+              <a:t>Model clicked?</a:t>
+            </a:r>
+          </a:p>
+        </p:txBody>
+      </p:sp>
+      <p:sp>
+        <p:nvSpPr>
+          <p:cNvPr id="95" name="TextBox 94">
+            <a:extLst>
+              <a:ext uri="{FF2B5EF4-FFF2-40B4-BE49-F238E27FC236}">
+                <a16:creationId xmlns:a16="http://schemas.microsoft.com/office/drawing/2014/main" id="{C1FE5E99-76E0-475D-9609-9DB6F094F47A}"/>
+              </a:ext>
+            </a:extLst>
+          </p:cNvPr>
+          <p:cNvSpPr txBox="1"/>
+          <p:nvPr/>
+        </p:nvSpPr>
+        <p:spPr>
+          <a:xfrm>
+            <a:off x="3066120" y="4650873"/>
+            <a:ext cx="1156083" cy="276999"/>
+          </a:xfrm>
+          <a:prstGeom prst="rect">
+            <a:avLst/>
+          </a:prstGeom>
+          <a:noFill/>
+        </p:spPr>
+        <p:txBody>
+          <a:bodyPr wrap="square" rtlCol="0">
+            <a:spAutoFit/>
+          </a:bodyPr>
+          <a:lstStyle/>
+          <a:p>
+            <a:r>
+              <a:rPr lang="en-US" sz="1200" dirty="0">
+                <a:solidFill>
+                  <a:srgbClr val="FF0000"/>
+                </a:solidFill>
+              </a:rPr>
+              <a:t>Widget action</a:t>
+            </a:r>
+          </a:p>
+        </p:txBody>
+      </p:sp>
+      <p:sp>
+        <p:nvSpPr>
+          <p:cNvPr id="96" name="TextBox 95">
+            <a:extLst>
+              <a:ext uri="{FF2B5EF4-FFF2-40B4-BE49-F238E27FC236}">
+                <a16:creationId xmlns:a16="http://schemas.microsoft.com/office/drawing/2014/main" id="{AE19EA6D-C2E2-4047-8321-FF85BDC4490A}"/>
+              </a:ext>
+            </a:extLst>
+          </p:cNvPr>
+          <p:cNvSpPr txBox="1"/>
+          <p:nvPr/>
+        </p:nvSpPr>
+        <p:spPr>
+          <a:xfrm>
+            <a:off x="4484868" y="3914486"/>
+            <a:ext cx="569572" cy="276999"/>
+          </a:xfrm>
+          <a:prstGeom prst="rect">
+            <a:avLst/>
+          </a:prstGeom>
+          <a:noFill/>
+        </p:spPr>
+        <p:txBody>
+          <a:bodyPr wrap="square" rtlCol="0">
+            <a:spAutoFit/>
+          </a:bodyPr>
+          <a:lstStyle/>
+          <a:p>
+            <a:r>
+              <a:rPr lang="en-US" sz="1200" dirty="0">
+                <a:solidFill>
+                  <a:srgbClr val="0070C0"/>
+                </a:solidFill>
+              </a:rPr>
+              <a:t>Draw</a:t>
+            </a:r>
+          </a:p>
+        </p:txBody>
+      </p:sp>
+      <p:sp>
+        <p:nvSpPr>
+          <p:cNvPr id="97" name="TextBox 96">
+            <a:extLst>
+              <a:ext uri="{FF2B5EF4-FFF2-40B4-BE49-F238E27FC236}">
+                <a16:creationId xmlns:a16="http://schemas.microsoft.com/office/drawing/2014/main" id="{177A807A-6093-431C-B590-782042C400B2}"/>
+              </a:ext>
+            </a:extLst>
+          </p:cNvPr>
+          <p:cNvSpPr txBox="1"/>
+          <p:nvPr/>
+        </p:nvSpPr>
+        <p:spPr>
+          <a:xfrm>
+            <a:off x="4458848" y="4666280"/>
+            <a:ext cx="966628" cy="276999"/>
+          </a:xfrm>
+          <a:prstGeom prst="rect">
+            <a:avLst/>
+          </a:prstGeom>
+          <a:noFill/>
+        </p:spPr>
+        <p:txBody>
+          <a:bodyPr wrap="square" rtlCol="0">
+            <a:spAutoFit/>
+          </a:bodyPr>
+          <a:lstStyle/>
+          <a:p>
+            <a:r>
+              <a:rPr lang="en-US" sz="1200" dirty="0">
+                <a:solidFill>
+                  <a:srgbClr val="0070C0"/>
+                </a:solidFill>
+              </a:rPr>
+              <a:t>Model state</a:t>
+            </a:r>
+          </a:p>
+        </p:txBody>
+      </p:sp>
+      <p:sp>
+        <p:nvSpPr>
+          <p:cNvPr id="98" name="TextBox 97">
+            <a:extLst>
+              <a:ext uri="{FF2B5EF4-FFF2-40B4-BE49-F238E27FC236}">
+                <a16:creationId xmlns:a16="http://schemas.microsoft.com/office/drawing/2014/main" id="{33326FE1-7D3F-489B-8627-5FFB84FAFE29}"/>
+              </a:ext>
+            </a:extLst>
+          </p:cNvPr>
+          <p:cNvSpPr txBox="1"/>
+          <p:nvPr/>
+        </p:nvSpPr>
+        <p:spPr>
+          <a:xfrm>
+            <a:off x="6724387" y="3969152"/>
+            <a:ext cx="569572" cy="276999"/>
+          </a:xfrm>
+          <a:prstGeom prst="rect">
+            <a:avLst/>
+          </a:prstGeom>
+          <a:noFill/>
+        </p:spPr>
+        <p:txBody>
+          <a:bodyPr wrap="square" rtlCol="0">
+            <a:spAutoFit/>
+          </a:bodyPr>
+          <a:lstStyle/>
+          <a:p>
+            <a:r>
+              <a:rPr lang="en-US" sz="1200" dirty="0">
+                <a:solidFill>
+                  <a:srgbClr val="0070C0"/>
+                </a:solidFill>
+              </a:rPr>
+              <a:t>Draw</a:t>
+            </a:r>
+          </a:p>
+        </p:txBody>
+      </p:sp>
+      <p:cxnSp>
+        <p:nvCxnSpPr>
+          <p:cNvPr id="104" name="Straight Arrow Connector 103">
+            <a:extLst>
+              <a:ext uri="{FF2B5EF4-FFF2-40B4-BE49-F238E27FC236}">
+                <a16:creationId xmlns:a16="http://schemas.microsoft.com/office/drawing/2014/main" id="{49E9277C-62B7-45C6-AF33-CB4F84C2B307}"/>
+              </a:ext>
+            </a:extLst>
+          </p:cNvPr>
+          <p:cNvCxnSpPr>
+            <a:cxnSpLocks/>
+          </p:cNvCxnSpPr>
+          <p:nvPr/>
+        </p:nvCxnSpPr>
+        <p:spPr>
+          <a:xfrm flipV="1">
+            <a:off x="5841736" y="1949553"/>
+            <a:ext cx="0" cy="796410"/>
+          </a:xfrm>
+          <a:prstGeom prst="straightConnector1">
+            <a:avLst/>
+          </a:prstGeom>
+          <a:ln w="25400">
+            <a:solidFill>
+              <a:schemeClr val="accent6"/>
+            </a:solidFill>
+            <a:prstDash val="solid"/>
+            <a:tailEnd type="arrow" w="lg" len="lg"/>
+          </a:ln>
+        </p:spPr>
+        <p:style>
+          <a:lnRef idx="1">
+            <a:schemeClr val="dk1"/>
+          </a:lnRef>
+          <a:fillRef idx="0">
+            <a:schemeClr val="dk1"/>
+          </a:fillRef>
+          <a:effectRef idx="0">
+            <a:schemeClr val="dk1"/>
+          </a:effectRef>
+          <a:fontRef idx="minor">
+            <a:schemeClr val="tx1"/>
+          </a:fontRef>
+        </p:style>
+      </p:cxnSp>
+      <p:cxnSp>
+        <p:nvCxnSpPr>
+          <p:cNvPr id="106" name="Straight Arrow Connector 105">
+            <a:extLst>
+              <a:ext uri="{FF2B5EF4-FFF2-40B4-BE49-F238E27FC236}">
+                <a16:creationId xmlns:a16="http://schemas.microsoft.com/office/drawing/2014/main" id="{D8FC1C35-014D-42DE-968F-561F4F274780}"/>
+              </a:ext>
+            </a:extLst>
+          </p:cNvPr>
+          <p:cNvCxnSpPr>
+            <a:cxnSpLocks/>
+          </p:cNvCxnSpPr>
+          <p:nvPr/>
+        </p:nvCxnSpPr>
+        <p:spPr>
+          <a:xfrm flipV="1">
+            <a:off x="5802528" y="1949554"/>
+            <a:ext cx="0" cy="1478105"/>
+          </a:xfrm>
+          <a:prstGeom prst="straightConnector1">
+            <a:avLst/>
+          </a:prstGeom>
+          <a:ln w="25400">
+            <a:solidFill>
+              <a:schemeClr val="accent6"/>
+            </a:solidFill>
+            <a:prstDash val="solid"/>
+            <a:tailEnd type="arrow" w="lg" len="lg"/>
+          </a:ln>
+        </p:spPr>
+        <p:style>
+          <a:lnRef idx="1">
+            <a:schemeClr val="dk1"/>
+          </a:lnRef>
+          <a:fillRef idx="0">
+            <a:schemeClr val="dk1"/>
+          </a:fillRef>
+          <a:effectRef idx="0">
+            <a:schemeClr val="dk1"/>
+          </a:effectRef>
+          <a:fontRef idx="minor">
+            <a:schemeClr val="tx1"/>
+          </a:fontRef>
+        </p:style>
+      </p:cxnSp>
+      <p:cxnSp>
+        <p:nvCxnSpPr>
+          <p:cNvPr id="108" name="Straight Arrow Connector 107">
+            <a:extLst>
+              <a:ext uri="{FF2B5EF4-FFF2-40B4-BE49-F238E27FC236}">
+                <a16:creationId xmlns:a16="http://schemas.microsoft.com/office/drawing/2014/main" id="{88194C1E-20D1-4FAA-8306-DC3235EF3AB5}"/>
+              </a:ext>
+            </a:extLst>
+          </p:cNvPr>
+          <p:cNvCxnSpPr>
+            <a:cxnSpLocks/>
+          </p:cNvCxnSpPr>
+          <p:nvPr/>
+        </p:nvCxnSpPr>
+        <p:spPr>
+          <a:xfrm>
+            <a:off x="7269018" y="3914486"/>
+            <a:ext cx="0" cy="1000398"/>
+          </a:xfrm>
+          <a:prstGeom prst="straightConnector1">
+            <a:avLst/>
+          </a:prstGeom>
+          <a:ln w="25400">
+            <a:solidFill>
+              <a:schemeClr val="accent6"/>
+            </a:solidFill>
+            <a:prstDash val="solid"/>
+            <a:tailEnd type="arrow" w="lg" len="lg"/>
+          </a:ln>
+        </p:spPr>
+        <p:style>
+          <a:lnRef idx="1">
+            <a:schemeClr val="dk1"/>
+          </a:lnRef>
+          <a:fillRef idx="0">
+            <a:schemeClr val="dk1"/>
+          </a:fillRef>
+          <a:effectRef idx="0">
+            <a:schemeClr val="dk1"/>
+          </a:effectRef>
+          <a:fontRef idx="minor">
+            <a:schemeClr val="tx1"/>
+          </a:fontRef>
+        </p:style>
+      </p:cxnSp>
+      <p:sp>
+        <p:nvSpPr>
+          <p:cNvPr id="110" name="TextBox 109">
+            <a:extLst>
+              <a:ext uri="{FF2B5EF4-FFF2-40B4-BE49-F238E27FC236}">
+                <a16:creationId xmlns:a16="http://schemas.microsoft.com/office/drawing/2014/main" id="{54069AC1-9B78-4D4F-A641-05903190ED59}"/>
+              </a:ext>
+            </a:extLst>
+          </p:cNvPr>
+          <p:cNvSpPr txBox="1"/>
+          <p:nvPr/>
+        </p:nvSpPr>
+        <p:spPr>
+          <a:xfrm>
+            <a:off x="6687690" y="4580567"/>
+            <a:ext cx="623200" cy="276999"/>
+          </a:xfrm>
+          <a:prstGeom prst="rect">
+            <a:avLst/>
+          </a:prstGeom>
+          <a:noFill/>
+        </p:spPr>
+        <p:txBody>
+          <a:bodyPr wrap="square" rtlCol="0">
+            <a:spAutoFit/>
+          </a:bodyPr>
+          <a:lstStyle/>
+          <a:p>
+            <a:r>
+              <a:rPr lang="en-US" sz="1200" dirty="0" err="1">
+                <a:solidFill>
+                  <a:schemeClr val="accent6"/>
+                </a:solidFill>
+              </a:rPr>
+              <a:t>doTick</a:t>
+            </a:r>
+            <a:endParaRPr lang="en-US" sz="1200" dirty="0">
+              <a:solidFill>
+                <a:schemeClr val="accent6"/>
+              </a:solidFill>
+            </a:endParaRPr>
+          </a:p>
+        </p:txBody>
+      </p:sp>
+      <p:sp>
+        <p:nvSpPr>
+          <p:cNvPr id="111" name="TextBox 110">
+            <a:extLst>
+              <a:ext uri="{FF2B5EF4-FFF2-40B4-BE49-F238E27FC236}">
+                <a16:creationId xmlns:a16="http://schemas.microsoft.com/office/drawing/2014/main" id="{BD9D18EE-3FC1-4E5F-9313-F54BE3AF173C}"/>
+              </a:ext>
+            </a:extLst>
+          </p:cNvPr>
+          <p:cNvSpPr txBox="1"/>
+          <p:nvPr/>
+        </p:nvSpPr>
+        <p:spPr>
+          <a:xfrm>
+            <a:off x="7933693" y="1155118"/>
+            <a:ext cx="2363436" cy="338554"/>
+          </a:xfrm>
+          <a:prstGeom prst="rect">
+            <a:avLst/>
+          </a:prstGeom>
+          <a:noFill/>
+        </p:spPr>
+        <p:txBody>
+          <a:bodyPr wrap="square" rtlCol="0">
+            <a:spAutoFit/>
+          </a:bodyPr>
+          <a:lstStyle/>
+          <a:p>
+            <a:pPr algn="ctr"/>
+            <a:r>
+              <a:rPr lang="en-US" sz="1600" u="sng" dirty="0"/>
+              <a:t>Legend</a:t>
+            </a:r>
+            <a:endParaRPr lang="en-SG" sz="1600" u="sng" dirty="0"/>
+          </a:p>
+        </p:txBody>
+      </p:sp>
+    </p:spTree>
+    <p:extLst>
+      <p:ext uri="{BB962C8B-B14F-4D97-AF65-F5344CB8AC3E}">
+        <p14:creationId xmlns:p14="http://schemas.microsoft.com/office/powerpoint/2010/main" val="1622299888"/>
+      </p:ext>
+    </p:extLst>
+  </p:cSld>
+  <p:clrMapOvr>
+    <a:masterClrMapping/>
+  </p:clrMapOvr>
+</p:sld>
+</file>
+
 <file path=ppt/theme/theme1.xml><?xml version="1.0" encoding="utf-8"?>
 <a:theme xmlns:a="http://schemas.openxmlformats.org/drawingml/2006/main" name="Office Theme">
   <a:themeElements>

</xml_diff>

<commit_message>
Update guide with new Message system
</commit_message>
<xml_diff>
--- a/docs/diagrams/ArchitectureDiagram.pptx
+++ b/docs/diagrams/ArchitectureDiagram.pptx
@@ -274,7 +274,7 @@
           <a:p>
             <a:fld id="{A1DDB25B-591A-4807-BF87-81D6EC4FFA73}" type="datetimeFigureOut">
               <a:rPr lang="en-SG" smtClean="0"/>
-              <a:t>27/5/2020</a:t>
+              <a:t>26/10/2020</a:t>
             </a:fld>
             <a:endParaRPr lang="en-SG"/>
           </a:p>
@@ -474,7 +474,7 @@
           <a:p>
             <a:fld id="{A1DDB25B-591A-4807-BF87-81D6EC4FFA73}" type="datetimeFigureOut">
               <a:rPr lang="en-SG" smtClean="0"/>
-              <a:t>27/5/2020</a:t>
+              <a:t>26/10/2020</a:t>
             </a:fld>
             <a:endParaRPr lang="en-SG"/>
           </a:p>
@@ -684,7 +684,7 @@
           <a:p>
             <a:fld id="{A1DDB25B-591A-4807-BF87-81D6EC4FFA73}" type="datetimeFigureOut">
               <a:rPr lang="en-SG" smtClean="0"/>
-              <a:t>27/5/2020</a:t>
+              <a:t>26/10/2020</a:t>
             </a:fld>
             <a:endParaRPr lang="en-SG"/>
           </a:p>
@@ -884,7 +884,7 @@
           <a:p>
             <a:fld id="{A1DDB25B-591A-4807-BF87-81D6EC4FFA73}" type="datetimeFigureOut">
               <a:rPr lang="en-SG" smtClean="0"/>
-              <a:t>27/5/2020</a:t>
+              <a:t>26/10/2020</a:t>
             </a:fld>
             <a:endParaRPr lang="en-SG"/>
           </a:p>
@@ -1160,7 +1160,7 @@
           <a:p>
             <a:fld id="{A1DDB25B-591A-4807-BF87-81D6EC4FFA73}" type="datetimeFigureOut">
               <a:rPr lang="en-SG" smtClean="0"/>
-              <a:t>27/5/2020</a:t>
+              <a:t>26/10/2020</a:t>
             </a:fld>
             <a:endParaRPr lang="en-SG"/>
           </a:p>
@@ -1428,7 +1428,7 @@
           <a:p>
             <a:fld id="{A1DDB25B-591A-4807-BF87-81D6EC4FFA73}" type="datetimeFigureOut">
               <a:rPr lang="en-SG" smtClean="0"/>
-              <a:t>27/5/2020</a:t>
+              <a:t>26/10/2020</a:t>
             </a:fld>
             <a:endParaRPr lang="en-SG"/>
           </a:p>
@@ -1843,7 +1843,7 @@
           <a:p>
             <a:fld id="{A1DDB25B-591A-4807-BF87-81D6EC4FFA73}" type="datetimeFigureOut">
               <a:rPr lang="en-SG" smtClean="0"/>
-              <a:t>27/5/2020</a:t>
+              <a:t>26/10/2020</a:t>
             </a:fld>
             <a:endParaRPr lang="en-SG"/>
           </a:p>
@@ -1985,7 +1985,7 @@
           <a:p>
             <a:fld id="{A1DDB25B-591A-4807-BF87-81D6EC4FFA73}" type="datetimeFigureOut">
               <a:rPr lang="en-SG" smtClean="0"/>
-              <a:t>27/5/2020</a:t>
+              <a:t>26/10/2020</a:t>
             </a:fld>
             <a:endParaRPr lang="en-SG"/>
           </a:p>
@@ -2098,7 +2098,7 @@
           <a:p>
             <a:fld id="{A1DDB25B-591A-4807-BF87-81D6EC4FFA73}" type="datetimeFigureOut">
               <a:rPr lang="en-SG" smtClean="0"/>
-              <a:t>27/5/2020</a:t>
+              <a:t>26/10/2020</a:t>
             </a:fld>
             <a:endParaRPr lang="en-SG"/>
           </a:p>
@@ -2411,7 +2411,7 @@
           <a:p>
             <a:fld id="{A1DDB25B-591A-4807-BF87-81D6EC4FFA73}" type="datetimeFigureOut">
               <a:rPr lang="en-SG" smtClean="0"/>
-              <a:t>27/5/2020</a:t>
+              <a:t>26/10/2020</a:t>
             </a:fld>
             <a:endParaRPr lang="en-SG"/>
           </a:p>
@@ -2700,7 +2700,7 @@
           <a:p>
             <a:fld id="{A1DDB25B-591A-4807-BF87-81D6EC4FFA73}" type="datetimeFigureOut">
               <a:rPr lang="en-SG" smtClean="0"/>
-              <a:t>27/5/2020</a:t>
+              <a:t>26/10/2020</a:t>
             </a:fld>
             <a:endParaRPr lang="en-SG"/>
           </a:p>
@@ -2943,7 +2943,7 @@
           <a:p>
             <a:fld id="{A1DDB25B-591A-4807-BF87-81D6EC4FFA73}" type="datetimeFigureOut">
               <a:rPr lang="en-SG" smtClean="0"/>
-              <a:t>27/5/2020</a:t>
+              <a:t>26/10/2020</a:t>
             </a:fld>
             <a:endParaRPr lang="en-SG"/>
           </a:p>
@@ -3909,153 +3909,6 @@
           </a:p>
         </p:txBody>
       </p:sp>
-      <p:sp>
-        <p:nvSpPr>
-          <p:cNvPr id="30" name="Rectangle: Rounded Corners 29">
-            <a:extLst>
-              <a:ext uri="{FF2B5EF4-FFF2-40B4-BE49-F238E27FC236}">
-                <a16:creationId xmlns:a16="http://schemas.microsoft.com/office/drawing/2014/main" id="{23FE1AE7-EF4F-4D49-8950-3354858C3EFD}"/>
-              </a:ext>
-            </a:extLst>
-          </p:cNvPr>
-          <p:cNvSpPr/>
-          <p:nvPr/>
-        </p:nvSpPr>
-        <p:spPr>
-          <a:xfrm>
-            <a:off x="7927741" y="1320126"/>
-            <a:ext cx="1827442" cy="609316"/>
-          </a:xfrm>
-          <a:prstGeom prst="roundRect">
-            <a:avLst>
-              <a:gd name="adj" fmla="val 5708"/>
-            </a:avLst>
-          </a:prstGeom>
-          <a:solidFill>
-            <a:schemeClr val="bg1">
-              <a:lumMod val="85000"/>
-            </a:schemeClr>
-          </a:solidFill>
-          <a:ln w="12700"/>
-        </p:spPr>
-        <p:style>
-          <a:lnRef idx="2">
-            <a:schemeClr val="dk1">
-              <a:shade val="50000"/>
-            </a:schemeClr>
-          </a:lnRef>
-          <a:fillRef idx="1">
-            <a:schemeClr val="dk1"/>
-          </a:fillRef>
-          <a:effectRef idx="0">
-            <a:schemeClr val="dk1"/>
-          </a:effectRef>
-          <a:fontRef idx="minor">
-            <a:schemeClr val="lt1"/>
-          </a:fontRef>
-        </p:style>
-        <p:txBody>
-          <a:bodyPr rtlCol="0" anchor="ctr" anchorCtr="0"/>
-          <a:lstStyle/>
-          <a:p>
-            <a:pPr algn="ctr"/>
-            <a:r>
-              <a:rPr lang="en-US" dirty="0" err="1">
-                <a:solidFill>
-                  <a:schemeClr val="tx1"/>
-                </a:solidFill>
-              </a:rPr>
-              <a:t>MessageHandler</a:t>
-            </a:r>
-            <a:endParaRPr lang="en-SG" dirty="0">
-              <a:solidFill>
-                <a:schemeClr val="tx1"/>
-              </a:solidFill>
-            </a:endParaRPr>
-          </a:p>
-        </p:txBody>
-      </p:sp>
-      <p:cxnSp>
-        <p:nvCxnSpPr>
-          <p:cNvPr id="31" name="Straight Arrow Connector 30">
-            <a:extLst>
-              <a:ext uri="{FF2B5EF4-FFF2-40B4-BE49-F238E27FC236}">
-                <a16:creationId xmlns:a16="http://schemas.microsoft.com/office/drawing/2014/main" id="{ACB4C1C6-F05A-4240-96B1-E20F5B246629}"/>
-              </a:ext>
-            </a:extLst>
-          </p:cNvPr>
-          <p:cNvCxnSpPr>
-            <a:cxnSpLocks/>
-            <a:stCxn id="4" idx="0"/>
-            <a:endCxn id="30" idx="2"/>
-          </p:cNvCxnSpPr>
-          <p:nvPr/>
-        </p:nvCxnSpPr>
-        <p:spPr>
-          <a:xfrm flipV="1">
-            <a:off x="8841462" y="1929442"/>
-            <a:ext cx="0" cy="1043303"/>
-          </a:xfrm>
-          <a:prstGeom prst="straightConnector1">
-            <a:avLst/>
-          </a:prstGeom>
-          <a:ln w="12700">
-            <a:prstDash val="dash"/>
-            <a:tailEnd type="arrow" w="lg" len="lg"/>
-          </a:ln>
-        </p:spPr>
-        <p:style>
-          <a:lnRef idx="1">
-            <a:schemeClr val="dk1"/>
-          </a:lnRef>
-          <a:fillRef idx="0">
-            <a:schemeClr val="dk1"/>
-          </a:fillRef>
-          <a:effectRef idx="0">
-            <a:schemeClr val="dk1"/>
-          </a:effectRef>
-          <a:fontRef idx="minor">
-            <a:schemeClr val="tx1"/>
-          </a:fontRef>
-        </p:style>
-      </p:cxnSp>
-      <p:sp>
-        <p:nvSpPr>
-          <p:cNvPr id="33" name="TextBox 32">
-            <a:extLst>
-              <a:ext uri="{FF2B5EF4-FFF2-40B4-BE49-F238E27FC236}">
-                <a16:creationId xmlns:a16="http://schemas.microsoft.com/office/drawing/2014/main" id="{90F3FC7D-5ABC-428D-B63C-513E9C2A2E79}"/>
-              </a:ext>
-            </a:extLst>
-          </p:cNvPr>
-          <p:cNvSpPr txBox="1"/>
-          <p:nvPr/>
-        </p:nvSpPr>
-        <p:spPr>
-          <a:xfrm>
-            <a:off x="8719432" y="2326414"/>
-            <a:ext cx="1261824" cy="646331"/>
-          </a:xfrm>
-          <a:prstGeom prst="rect">
-            <a:avLst/>
-          </a:prstGeom>
-          <a:noFill/>
-        </p:spPr>
-        <p:txBody>
-          <a:bodyPr wrap="square" rtlCol="0">
-            <a:spAutoFit/>
-          </a:bodyPr>
-          <a:lstStyle/>
-          <a:p>
-            <a:pPr algn="ctr"/>
-            <a:r>
-              <a:rPr lang="en-US" dirty="0"/>
-              <a:t>Polls for Messages</a:t>
-            </a:r>
-            <a:endParaRPr lang="en-SG" dirty="0"/>
-          </a:p>
-        </p:txBody>
-      </p:sp>
       <p:cxnSp>
         <p:nvCxnSpPr>
           <p:cNvPr id="34" name="Straight Arrow Connector 33">
@@ -4413,72 +4266,6 @@
           </a:fontRef>
         </p:style>
       </p:cxnSp>
-      <p:sp>
-        <p:nvSpPr>
-          <p:cNvPr id="60" name="Rectangle: Rounded Corners 59">
-            <a:extLst>
-              <a:ext uri="{FF2B5EF4-FFF2-40B4-BE49-F238E27FC236}">
-                <a16:creationId xmlns:a16="http://schemas.microsoft.com/office/drawing/2014/main" id="{920C7FC8-FC9A-42DF-BA7D-D83A0C44AA6C}"/>
-              </a:ext>
-            </a:extLst>
-          </p:cNvPr>
-          <p:cNvSpPr/>
-          <p:nvPr/>
-        </p:nvSpPr>
-        <p:spPr>
-          <a:xfrm>
-            <a:off x="6304237" y="1045355"/>
-            <a:ext cx="1261824" cy="366979"/>
-          </a:xfrm>
-          <a:prstGeom prst="roundRect">
-            <a:avLst>
-              <a:gd name="adj" fmla="val 5708"/>
-            </a:avLst>
-          </a:prstGeom>
-          <a:solidFill>
-            <a:schemeClr val="bg1">
-              <a:lumMod val="85000"/>
-            </a:schemeClr>
-          </a:solidFill>
-          <a:ln w="12700"/>
-        </p:spPr>
-        <p:style>
-          <a:lnRef idx="2">
-            <a:schemeClr val="dk1">
-              <a:shade val="50000"/>
-            </a:schemeClr>
-          </a:lnRef>
-          <a:fillRef idx="1">
-            <a:schemeClr val="dk1"/>
-          </a:fillRef>
-          <a:effectRef idx="0">
-            <a:schemeClr val="dk1"/>
-          </a:effectRef>
-          <a:fontRef idx="minor">
-            <a:schemeClr val="lt1"/>
-          </a:fontRef>
-        </p:style>
-        <p:txBody>
-          <a:bodyPr rtlCol="0" anchor="ctr" anchorCtr="0"/>
-          <a:lstStyle/>
-          <a:p>
-            <a:pPr algn="ctr"/>
-            <a:r>
-              <a:rPr lang="en-US" dirty="0">
-                <a:solidFill>
-                  <a:schemeClr val="tx1"/>
-                </a:solidFill>
-              </a:rPr>
-              <a:t>Message</a:t>
-            </a:r>
-            <a:endParaRPr lang="en-SG" dirty="0">
-              <a:solidFill>
-                <a:schemeClr val="tx1"/>
-              </a:solidFill>
-            </a:endParaRPr>
-          </a:p>
-        </p:txBody>
-      </p:sp>
       <p:cxnSp>
         <p:nvCxnSpPr>
           <p:cNvPr id="66" name="Straight Arrow Connector 65">
@@ -4597,129 +4384,6 @@
             <a:r>
               <a:rPr lang="en-US" dirty="0"/>
               <a:t>Calls output functions</a:t>
-            </a:r>
-            <a:endParaRPr lang="en-SG" dirty="0"/>
-          </a:p>
-        </p:txBody>
-      </p:sp>
-      <p:cxnSp>
-        <p:nvCxnSpPr>
-          <p:cNvPr id="83" name="Connector: Elbow 82">
-            <a:extLst>
-              <a:ext uri="{FF2B5EF4-FFF2-40B4-BE49-F238E27FC236}">
-                <a16:creationId xmlns:a16="http://schemas.microsoft.com/office/drawing/2014/main" id="{867E5C25-6294-4E8A-A13F-84098573125D}"/>
-              </a:ext>
-            </a:extLst>
-          </p:cNvPr>
-          <p:cNvCxnSpPr>
-            <a:cxnSpLocks/>
-            <a:stCxn id="5" idx="0"/>
-            <a:endCxn id="30" idx="1"/>
-          </p:cNvCxnSpPr>
-          <p:nvPr/>
-        </p:nvCxnSpPr>
-        <p:spPr>
-          <a:xfrm rot="5400000" flipH="1" flipV="1">
-            <a:off x="6636076" y="566880"/>
-            <a:ext cx="233760" cy="2349569"/>
-          </a:xfrm>
-          <a:prstGeom prst="bentConnector2">
-            <a:avLst/>
-          </a:prstGeom>
-          <a:ln w="12700">
-            <a:tailEnd type="arrow" w="lg" len="lg"/>
-          </a:ln>
-        </p:spPr>
-        <p:style>
-          <a:lnRef idx="1">
-            <a:schemeClr val="dk1"/>
-          </a:lnRef>
-          <a:fillRef idx="0">
-            <a:schemeClr val="dk1"/>
-          </a:fillRef>
-          <a:effectRef idx="0">
-            <a:schemeClr val="dk1"/>
-          </a:effectRef>
-          <a:fontRef idx="minor">
-            <a:schemeClr val="tx1"/>
-          </a:fontRef>
-        </p:style>
-      </p:cxnSp>
-      <p:cxnSp>
-        <p:nvCxnSpPr>
-          <p:cNvPr id="88" name="Straight Arrow Connector 87">
-            <a:extLst>
-              <a:ext uri="{FF2B5EF4-FFF2-40B4-BE49-F238E27FC236}">
-                <a16:creationId xmlns:a16="http://schemas.microsoft.com/office/drawing/2014/main" id="{201ACF59-48E7-47B8-A1D4-F66EE6F8244E}"/>
-              </a:ext>
-            </a:extLst>
-          </p:cNvPr>
-          <p:cNvCxnSpPr>
-            <a:cxnSpLocks/>
-            <a:endCxn id="60" idx="2"/>
-          </p:cNvCxnSpPr>
-          <p:nvPr/>
-        </p:nvCxnSpPr>
-        <p:spPr>
-          <a:xfrm flipV="1">
-            <a:off x="6935149" y="1412334"/>
-            <a:ext cx="0" cy="205577"/>
-          </a:xfrm>
-          <a:prstGeom prst="straightConnector1">
-            <a:avLst/>
-          </a:prstGeom>
-          <a:ln w="12700">
-            <a:prstDash val="dash"/>
-            <a:tailEnd type="none" w="lg" len="lg"/>
-          </a:ln>
-        </p:spPr>
-        <p:style>
-          <a:lnRef idx="1">
-            <a:schemeClr val="dk1"/>
-          </a:lnRef>
-          <a:fillRef idx="0">
-            <a:schemeClr val="dk1"/>
-          </a:fillRef>
-          <a:effectRef idx="0">
-            <a:schemeClr val="dk1"/>
-          </a:effectRef>
-          <a:fontRef idx="minor">
-            <a:schemeClr val="tx1"/>
-          </a:fontRef>
-        </p:style>
-      </p:cxnSp>
-      <p:sp>
-        <p:nvSpPr>
-          <p:cNvPr id="91" name="TextBox 90">
-            <a:extLst>
-              <a:ext uri="{FF2B5EF4-FFF2-40B4-BE49-F238E27FC236}">
-                <a16:creationId xmlns:a16="http://schemas.microsoft.com/office/drawing/2014/main" id="{60D11ADA-7219-4457-841F-22E572F98393}"/>
-              </a:ext>
-            </a:extLst>
-          </p:cNvPr>
-          <p:cNvSpPr txBox="1"/>
-          <p:nvPr/>
-        </p:nvSpPr>
-        <p:spPr>
-          <a:xfrm>
-            <a:off x="4917505" y="969815"/>
-            <a:ext cx="1261824" cy="646331"/>
-          </a:xfrm>
-          <a:prstGeom prst="rect">
-            <a:avLst/>
-          </a:prstGeom>
-          <a:noFill/>
-        </p:spPr>
-        <p:txBody>
-          <a:bodyPr wrap="square" rtlCol="0">
-            <a:spAutoFit/>
-          </a:bodyPr>
-          <a:lstStyle/>
-          <a:p>
-            <a:pPr algn="ctr"/>
-            <a:r>
-              <a:rPr lang="en-US" dirty="0"/>
-              <a:t>Sends Messages</a:t>
             </a:r>
             <a:endParaRPr lang="en-SG" dirty="0"/>
           </a:p>
@@ -6062,51 +5726,6 @@
           </a:fontRef>
         </p:style>
       </p:cxnSp>
-      <p:cxnSp>
-        <p:nvCxnSpPr>
-          <p:cNvPr id="71" name="Straight Arrow Connector 70">
-            <a:extLst>
-              <a:ext uri="{FF2B5EF4-FFF2-40B4-BE49-F238E27FC236}">
-                <a16:creationId xmlns:a16="http://schemas.microsoft.com/office/drawing/2014/main" id="{5363499A-FFE4-4E29-8426-6C0F316E94FB}"/>
-              </a:ext>
-            </a:extLst>
-          </p:cNvPr>
-          <p:cNvCxnSpPr>
-            <a:cxnSpLocks/>
-          </p:cNvCxnSpPr>
-          <p:nvPr/>
-        </p:nvCxnSpPr>
-        <p:spPr>
-          <a:xfrm flipV="1">
-            <a:off x="5759673" y="1949553"/>
-            <a:ext cx="0" cy="2211477"/>
-          </a:xfrm>
-          <a:prstGeom prst="straightConnector1">
-            <a:avLst/>
-          </a:prstGeom>
-          <a:ln w="25400">
-            <a:solidFill>
-              <a:schemeClr val="accent6"/>
-            </a:solidFill>
-            <a:prstDash val="solid"/>
-            <a:tailEnd type="arrow" w="lg" len="lg"/>
-          </a:ln>
-        </p:spPr>
-        <p:style>
-          <a:lnRef idx="1">
-            <a:schemeClr val="dk1"/>
-          </a:lnRef>
-          <a:fillRef idx="0">
-            <a:schemeClr val="dk1"/>
-          </a:fillRef>
-          <a:effectRef idx="0">
-            <a:schemeClr val="dk1"/>
-          </a:effectRef>
-          <a:fontRef idx="minor">
-            <a:schemeClr val="tx1"/>
-          </a:fontRef>
-        </p:style>
-      </p:cxnSp>
       <p:sp>
         <p:nvSpPr>
           <p:cNvPr id="73" name="TextBox 72">
@@ -6386,45 +6005,6 @@
       </p:sp>
       <p:sp>
         <p:nvSpPr>
-          <p:cNvPr id="85" name="TextBox 84">
-            <a:extLst>
-              <a:ext uri="{FF2B5EF4-FFF2-40B4-BE49-F238E27FC236}">
-                <a16:creationId xmlns:a16="http://schemas.microsoft.com/office/drawing/2014/main" id="{0EF806D3-401F-4824-9A08-E418EE88FE9C}"/>
-              </a:ext>
-            </a:extLst>
-          </p:cNvPr>
-          <p:cNvSpPr txBox="1"/>
-          <p:nvPr/>
-        </p:nvSpPr>
-        <p:spPr>
-          <a:xfrm>
-            <a:off x="5802528" y="2102082"/>
-            <a:ext cx="794010" cy="276999"/>
-          </a:xfrm>
-          <a:prstGeom prst="rect">
-            <a:avLst/>
-          </a:prstGeom>
-          <a:noFill/>
-        </p:spPr>
-        <p:txBody>
-          <a:bodyPr wrap="square" rtlCol="0">
-            <a:spAutoFit/>
-          </a:bodyPr>
-          <a:lstStyle/>
-          <a:p>
-            <a:r>
-              <a:rPr lang="en-US" sz="1200" dirty="0">
-                <a:solidFill>
-                  <a:schemeClr val="accent6"/>
-                </a:solidFill>
-              </a:rPr>
-              <a:t>Messages</a:t>
-            </a:r>
-          </a:p>
-        </p:txBody>
-      </p:sp>
-      <p:sp>
-        <p:nvSpPr>
           <p:cNvPr id="86" name="TextBox 85">
             <a:extLst>
               <a:ext uri="{FF2B5EF4-FFF2-40B4-BE49-F238E27FC236}">
@@ -6813,96 +6393,6 @@
           </a:p>
         </p:txBody>
       </p:sp>
-      <p:cxnSp>
-        <p:nvCxnSpPr>
-          <p:cNvPr id="104" name="Straight Arrow Connector 103">
-            <a:extLst>
-              <a:ext uri="{FF2B5EF4-FFF2-40B4-BE49-F238E27FC236}">
-                <a16:creationId xmlns:a16="http://schemas.microsoft.com/office/drawing/2014/main" id="{49E9277C-62B7-45C6-AF33-CB4F84C2B307}"/>
-              </a:ext>
-            </a:extLst>
-          </p:cNvPr>
-          <p:cNvCxnSpPr>
-            <a:cxnSpLocks/>
-          </p:cNvCxnSpPr>
-          <p:nvPr/>
-        </p:nvCxnSpPr>
-        <p:spPr>
-          <a:xfrm flipV="1">
-            <a:off x="5841736" y="1949553"/>
-            <a:ext cx="0" cy="796410"/>
-          </a:xfrm>
-          <a:prstGeom prst="straightConnector1">
-            <a:avLst/>
-          </a:prstGeom>
-          <a:ln w="25400">
-            <a:solidFill>
-              <a:schemeClr val="accent6"/>
-            </a:solidFill>
-            <a:prstDash val="solid"/>
-            <a:tailEnd type="arrow" w="lg" len="lg"/>
-          </a:ln>
-        </p:spPr>
-        <p:style>
-          <a:lnRef idx="1">
-            <a:schemeClr val="dk1"/>
-          </a:lnRef>
-          <a:fillRef idx="0">
-            <a:schemeClr val="dk1"/>
-          </a:fillRef>
-          <a:effectRef idx="0">
-            <a:schemeClr val="dk1"/>
-          </a:effectRef>
-          <a:fontRef idx="minor">
-            <a:schemeClr val="tx1"/>
-          </a:fontRef>
-        </p:style>
-      </p:cxnSp>
-      <p:cxnSp>
-        <p:nvCxnSpPr>
-          <p:cNvPr id="106" name="Straight Arrow Connector 105">
-            <a:extLst>
-              <a:ext uri="{FF2B5EF4-FFF2-40B4-BE49-F238E27FC236}">
-                <a16:creationId xmlns:a16="http://schemas.microsoft.com/office/drawing/2014/main" id="{D8FC1C35-014D-42DE-968F-561F4F274780}"/>
-              </a:ext>
-            </a:extLst>
-          </p:cNvPr>
-          <p:cNvCxnSpPr>
-            <a:cxnSpLocks/>
-          </p:cNvCxnSpPr>
-          <p:nvPr/>
-        </p:nvCxnSpPr>
-        <p:spPr>
-          <a:xfrm flipV="1">
-            <a:off x="5802528" y="1949554"/>
-            <a:ext cx="0" cy="1478105"/>
-          </a:xfrm>
-          <a:prstGeom prst="straightConnector1">
-            <a:avLst/>
-          </a:prstGeom>
-          <a:ln w="25400">
-            <a:solidFill>
-              <a:schemeClr val="accent6"/>
-            </a:solidFill>
-            <a:prstDash val="solid"/>
-            <a:tailEnd type="arrow" w="lg" len="lg"/>
-          </a:ln>
-        </p:spPr>
-        <p:style>
-          <a:lnRef idx="1">
-            <a:schemeClr val="dk1"/>
-          </a:lnRef>
-          <a:fillRef idx="0">
-            <a:schemeClr val="dk1"/>
-          </a:fillRef>
-          <a:effectRef idx="0">
-            <a:schemeClr val="dk1"/>
-          </a:effectRef>
-          <a:fontRef idx="minor">
-            <a:schemeClr val="tx1"/>
-          </a:fontRef>
-        </p:style>
-      </p:cxnSp>
       <p:cxnSp>
         <p:nvCxnSpPr>
           <p:cNvPr id="108" name="Straight Arrow Connector 107">

</xml_diff>